<commit_message>
Cliente - Con MiNullable
</commit_message>
<xml_diff>
--- a/Docs/Nullable.pptx
+++ b/Docs/Nullable.pptx
@@ -5,12 +5,13 @@
     <p:sldMasterId id="2147483648" r:id="rId1"/>
   </p:sldMasterIdLst>
   <p:notesMasterIdLst>
-    <p:notesMasterId r:id="rId5"/>
+    <p:notesMasterId r:id="rId6"/>
   </p:notesMasterIdLst>
   <p:sldIdLst>
     <p:sldId id="256" r:id="rId2"/>
     <p:sldId id="257" r:id="rId3"/>
     <p:sldId id="258" r:id="rId4"/>
+    <p:sldId id="259" r:id="rId5"/>
   </p:sldIdLst>
   <p:sldSz cx="12192000" cy="6858000"/>
   <p:notesSz cx="6858000" cy="9144000"/>
@@ -4486,8 +4487,8 @@
         </p:nvSpPr>
         <p:spPr>
           <a:xfrm>
-            <a:off x="2736273" y="5320145"/>
-            <a:ext cx="6719455" cy="646331"/>
+            <a:off x="3041606" y="5320145"/>
+            <a:ext cx="6108789" cy="646331"/>
           </a:xfrm>
           <a:prstGeom prst="rect">
             <a:avLst/>
@@ -4506,7 +4507,7 @@
                   <a:srgbClr val="FF0000"/>
                 </a:solidFill>
               </a:rPr>
-              <a:t>EL SEGUNDO ENFOQUE ES EL USADO POR LA ESTRUCTURA GENÉRICA Nullable&lt;T&gt;</a:t>
+              <a:t>EL SEGUNDO ENFOQUE ES ENCAPSULADO POR LA ESTRUCTURA GENÉRICA Nullable&lt;T&gt;</a:t>
             </a:r>
           </a:p>
         </p:txBody>
@@ -4515,6 +4516,539 @@
     <p:extLst>
       <p:ext uri="{BB962C8B-B14F-4D97-AF65-F5344CB8AC3E}">
         <p14:creationId xmlns:p14="http://schemas.microsoft.com/office/powerpoint/2010/main" val="3651473368"/>
+      </p:ext>
+    </p:extLst>
+  </p:cSld>
+  <p:clrMapOvr>
+    <a:masterClrMapping/>
+  </p:clrMapOvr>
+</p:sld>
+</file>
+
+<file path=ppt/slides/slide4.xml><?xml version="1.0" encoding="utf-8"?>
+<p:sld xmlns:a="http://schemas.openxmlformats.org/drawingml/2006/main" xmlns:r="http://schemas.openxmlformats.org/officeDocument/2006/relationships" xmlns:p="http://schemas.openxmlformats.org/presentationml/2006/main">
+  <p:cSld>
+    <p:spTree>
+      <p:nvGrpSpPr>
+        <p:cNvPr id="1" name=""/>
+        <p:cNvGrpSpPr/>
+        <p:nvPr/>
+      </p:nvGrpSpPr>
+      <p:grpSpPr>
+        <a:xfrm>
+          <a:off x="0" y="0"/>
+          <a:ext cx="0" cy="0"/>
+          <a:chOff x="0" y="0"/>
+          <a:chExt cx="0" cy="0"/>
+        </a:xfrm>
+      </p:grpSpPr>
+      <p:sp>
+        <p:nvSpPr>
+          <p:cNvPr id="2" name="Title 1">
+            <a:extLst>
+              <a:ext uri="{FF2B5EF4-FFF2-40B4-BE49-F238E27FC236}">
+                <a16:creationId xmlns:a16="http://schemas.microsoft.com/office/drawing/2014/main" id="{C0BF745E-AEF4-FC41-8C62-2CD30BFC4013}"/>
+              </a:ext>
+            </a:extLst>
+          </p:cNvPr>
+          <p:cNvSpPr>
+            <a:spLocks noGrp="1"/>
+          </p:cNvSpPr>
+          <p:nvPr>
+            <p:ph type="title"/>
+          </p:nvPr>
+        </p:nvSpPr>
+        <p:spPr>
+          <a:xfrm>
+            <a:off x="838200" y="133960"/>
+            <a:ext cx="10515600" cy="1325563"/>
+          </a:xfrm>
+        </p:spPr>
+        <p:txBody>
+          <a:bodyPr/>
+          <a:lstStyle/>
+          <a:p>
+            <a:r>
+              <a:rPr lang="en-US" dirty="0"/>
+              <a:t>La idea de la </a:t>
+            </a:r>
+            <a:r>
+              <a:rPr lang="en-US" dirty="0" err="1"/>
+              <a:t>estructura</a:t>
+            </a:r>
+            <a:r>
+              <a:rPr lang="en-US" dirty="0"/>
+              <a:t> Nullable&lt;T&gt;</a:t>
+            </a:r>
+          </a:p>
+        </p:txBody>
+      </p:sp>
+      <p:sp>
+        <p:nvSpPr>
+          <p:cNvPr id="3" name="Content Placeholder 2">
+            <a:extLst>
+              <a:ext uri="{FF2B5EF4-FFF2-40B4-BE49-F238E27FC236}">
+                <a16:creationId xmlns:a16="http://schemas.microsoft.com/office/drawing/2014/main" id="{D26B4350-136B-1F4C-9993-4A4A15BC2E49}"/>
+              </a:ext>
+            </a:extLst>
+          </p:cNvPr>
+          <p:cNvSpPr>
+            <a:spLocks noGrp="1"/>
+          </p:cNvSpPr>
+          <p:nvPr>
+            <p:ph idx="1"/>
+          </p:nvPr>
+        </p:nvSpPr>
+        <p:spPr>
+          <a:xfrm>
+            <a:off x="2356339" y="1494693"/>
+            <a:ext cx="7479323" cy="4717440"/>
+          </a:xfrm>
+        </p:spPr>
+        <p:txBody>
+          <a:bodyPr>
+            <a:normAutofit fontScale="25000" lnSpcReduction="20000"/>
+          </a:bodyPr>
+          <a:lstStyle/>
+          <a:p>
+            <a:pPr marL="0" indent="0">
+              <a:buNone/>
+            </a:pPr>
+            <a:r>
+              <a:rPr lang="en-US" sz="8000" dirty="0">
+                <a:solidFill>
+                  <a:schemeClr val="accent1">
+                    <a:lumMod val="75000"/>
+                  </a:schemeClr>
+                </a:solidFill>
+              </a:rPr>
+              <a:t>public struct </a:t>
+            </a:r>
+            <a:r>
+              <a:rPr lang="en-US" sz="8000" dirty="0" err="1">
+                <a:solidFill>
+                  <a:schemeClr val="accent1">
+                    <a:lumMod val="75000"/>
+                  </a:schemeClr>
+                </a:solidFill>
+              </a:rPr>
+              <a:t>MiNullable</a:t>
+            </a:r>
+            <a:r>
+              <a:rPr lang="en-US" sz="8000" dirty="0">
+                <a:solidFill>
+                  <a:schemeClr val="accent1">
+                    <a:lumMod val="75000"/>
+                  </a:schemeClr>
+                </a:solidFill>
+              </a:rPr>
+              <a:t>&lt;T&gt; where T : struct</a:t>
+            </a:r>
+          </a:p>
+          <a:p>
+            <a:pPr marL="0" indent="0">
+              <a:buNone/>
+            </a:pPr>
+            <a:r>
+              <a:rPr lang="en-US" sz="8000" dirty="0">
+                <a:solidFill>
+                  <a:schemeClr val="accent1">
+                    <a:lumMod val="75000"/>
+                  </a:schemeClr>
+                </a:solidFill>
+              </a:rPr>
+              <a:t>{</a:t>
+            </a:r>
+          </a:p>
+          <a:p>
+            <a:pPr marL="0" indent="0">
+              <a:buNone/>
+            </a:pPr>
+            <a:r>
+              <a:rPr lang="en-US" sz="8000" dirty="0">
+                <a:solidFill>
+                  <a:schemeClr val="accent1">
+                    <a:lumMod val="75000"/>
+                  </a:schemeClr>
+                </a:solidFill>
+              </a:rPr>
+              <a:t>      private </a:t>
+            </a:r>
+            <a:r>
+              <a:rPr lang="en-US" sz="8000" dirty="0" err="1">
+                <a:solidFill>
+                  <a:schemeClr val="accent1">
+                    <a:lumMod val="75000"/>
+                  </a:schemeClr>
+                </a:solidFill>
+              </a:rPr>
+              <a:t>readonly</a:t>
+            </a:r>
+            <a:r>
+              <a:rPr lang="en-US" sz="8000" dirty="0">
+                <a:solidFill>
+                  <a:schemeClr val="accent1">
+                    <a:lumMod val="75000"/>
+                  </a:schemeClr>
+                </a:solidFill>
+              </a:rPr>
+              <a:t> T value; private </a:t>
+            </a:r>
+            <a:r>
+              <a:rPr lang="en-US" sz="8000" dirty="0" err="1">
+                <a:solidFill>
+                  <a:schemeClr val="accent1">
+                    <a:lumMod val="75000"/>
+                  </a:schemeClr>
+                </a:solidFill>
+              </a:rPr>
+              <a:t>readonly</a:t>
+            </a:r>
+            <a:r>
+              <a:rPr lang="en-US" sz="8000" dirty="0">
+                <a:solidFill>
+                  <a:schemeClr val="accent1">
+                    <a:lumMod val="75000"/>
+                  </a:schemeClr>
+                </a:solidFill>
+              </a:rPr>
+              <a:t> bool </a:t>
+            </a:r>
+            <a:r>
+              <a:rPr lang="en-US" sz="8000" dirty="0" err="1">
+                <a:solidFill>
+                  <a:schemeClr val="accent1">
+                    <a:lumMod val="75000"/>
+                  </a:schemeClr>
+                </a:solidFill>
+              </a:rPr>
+              <a:t>hasValue</a:t>
+            </a:r>
+            <a:r>
+              <a:rPr lang="en-US" sz="8000" dirty="0">
+                <a:solidFill>
+                  <a:schemeClr val="accent1">
+                    <a:lumMod val="75000"/>
+                  </a:schemeClr>
+                </a:solidFill>
+              </a:rPr>
+              <a:t>;</a:t>
+            </a:r>
+          </a:p>
+          <a:p>
+            <a:pPr marL="0" indent="0">
+              <a:buNone/>
+            </a:pPr>
+            <a:r>
+              <a:rPr lang="en-US" sz="8000" dirty="0">
+                <a:solidFill>
+                  <a:schemeClr val="accent1">
+                    <a:lumMod val="75000"/>
+                  </a:schemeClr>
+                </a:solidFill>
+              </a:rPr>
+              <a:t>      public </a:t>
+            </a:r>
+            <a:r>
+              <a:rPr lang="en-US" sz="8000" dirty="0" err="1">
+                <a:solidFill>
+                  <a:schemeClr val="accent1">
+                    <a:lumMod val="75000"/>
+                  </a:schemeClr>
+                </a:solidFill>
+              </a:rPr>
+              <a:t>MiNullable</a:t>
+            </a:r>
+            <a:r>
+              <a:rPr lang="en-US" sz="8000" dirty="0">
+                <a:solidFill>
+                  <a:schemeClr val="accent1">
+                    <a:lumMod val="75000"/>
+                  </a:schemeClr>
+                </a:solidFill>
+              </a:rPr>
+              <a:t>(T value) { </a:t>
+            </a:r>
+            <a:r>
+              <a:rPr lang="en-US" sz="8000" dirty="0" err="1">
+                <a:solidFill>
+                  <a:schemeClr val="accent1">
+                    <a:lumMod val="75000"/>
+                  </a:schemeClr>
+                </a:solidFill>
+              </a:rPr>
+              <a:t>this.value</a:t>
+            </a:r>
+            <a:r>
+              <a:rPr lang="en-US" sz="8000" dirty="0">
+                <a:solidFill>
+                  <a:schemeClr val="accent1">
+                    <a:lumMod val="75000"/>
+                  </a:schemeClr>
+                </a:solidFill>
+              </a:rPr>
+              <a:t> = value; </a:t>
+            </a:r>
+            <a:r>
+              <a:rPr lang="en-US" sz="8000" dirty="0" err="1">
+                <a:solidFill>
+                  <a:schemeClr val="accent1">
+                    <a:lumMod val="75000"/>
+                  </a:schemeClr>
+                </a:solidFill>
+              </a:rPr>
+              <a:t>this.hasValue</a:t>
+            </a:r>
+            <a:r>
+              <a:rPr lang="en-US" sz="8000" dirty="0">
+                <a:solidFill>
+                  <a:schemeClr val="accent1">
+                    <a:lumMod val="75000"/>
+                  </a:schemeClr>
+                </a:solidFill>
+              </a:rPr>
+              <a:t> = true; }</a:t>
+            </a:r>
+          </a:p>
+          <a:p>
+            <a:pPr marL="0" indent="0">
+              <a:buNone/>
+            </a:pPr>
+            <a:r>
+              <a:rPr lang="en-US" sz="8000" dirty="0">
+                <a:solidFill>
+                  <a:schemeClr val="accent1">
+                    <a:lumMod val="75000"/>
+                  </a:schemeClr>
+                </a:solidFill>
+              </a:rPr>
+              <a:t>      public bool </a:t>
+            </a:r>
+            <a:r>
+              <a:rPr lang="en-US" sz="8000" dirty="0" err="1">
+                <a:solidFill>
+                  <a:schemeClr val="accent1">
+                    <a:lumMod val="75000"/>
+                  </a:schemeClr>
+                </a:solidFill>
+              </a:rPr>
+              <a:t>HasValue</a:t>
+            </a:r>
+            <a:r>
+              <a:rPr lang="en-US" sz="8000" dirty="0">
+                <a:solidFill>
+                  <a:schemeClr val="accent1">
+                    <a:lumMod val="75000"/>
+                  </a:schemeClr>
+                </a:solidFill>
+              </a:rPr>
+              <a:t> { get { return </a:t>
+            </a:r>
+            <a:r>
+              <a:rPr lang="en-US" sz="8000" dirty="0" err="1">
+                <a:solidFill>
+                  <a:schemeClr val="accent1">
+                    <a:lumMod val="75000"/>
+                  </a:schemeClr>
+                </a:solidFill>
+              </a:rPr>
+              <a:t>hasValue</a:t>
+            </a:r>
+            <a:r>
+              <a:rPr lang="en-US" sz="8000" dirty="0">
+                <a:solidFill>
+                  <a:schemeClr val="accent1">
+                    <a:lumMod val="75000"/>
+                  </a:schemeClr>
+                </a:solidFill>
+              </a:rPr>
+              <a:t>; } }</a:t>
+            </a:r>
+          </a:p>
+          <a:p>
+            <a:pPr marL="0" indent="0">
+              <a:buNone/>
+            </a:pPr>
+            <a:r>
+              <a:rPr lang="en-US" sz="8000" dirty="0">
+                <a:solidFill>
+                  <a:schemeClr val="accent1">
+                    <a:lumMod val="75000"/>
+                  </a:schemeClr>
+                </a:solidFill>
+              </a:rPr>
+              <a:t>      public T Value </a:t>
+            </a:r>
+          </a:p>
+          <a:p>
+            <a:pPr marL="0" indent="0">
+              <a:buNone/>
+            </a:pPr>
+            <a:r>
+              <a:rPr lang="en-US" sz="8000" dirty="0">
+                <a:solidFill>
+                  <a:schemeClr val="accent1">
+                    <a:lumMod val="75000"/>
+                  </a:schemeClr>
+                </a:solidFill>
+              </a:rPr>
+              <a:t>     {</a:t>
+            </a:r>
+          </a:p>
+          <a:p>
+            <a:pPr marL="0" indent="0">
+              <a:buNone/>
+            </a:pPr>
+            <a:r>
+              <a:rPr lang="en-US" sz="8000" dirty="0">
+                <a:solidFill>
+                  <a:schemeClr val="accent1">
+                    <a:lumMod val="75000"/>
+                  </a:schemeClr>
+                </a:solidFill>
+              </a:rPr>
+              <a:t>          get </a:t>
+            </a:r>
+          </a:p>
+          <a:p>
+            <a:pPr marL="0" indent="0">
+              <a:buNone/>
+            </a:pPr>
+            <a:r>
+              <a:rPr lang="en-US" sz="8000" dirty="0">
+                <a:solidFill>
+                  <a:schemeClr val="accent1">
+                    <a:lumMod val="75000"/>
+                  </a:schemeClr>
+                </a:solidFill>
+              </a:rPr>
+              <a:t>          {</a:t>
+            </a:r>
+          </a:p>
+          <a:p>
+            <a:pPr marL="0" indent="0">
+              <a:buNone/>
+            </a:pPr>
+            <a:r>
+              <a:rPr lang="en-US" sz="8000" dirty="0">
+                <a:solidFill>
+                  <a:schemeClr val="accent1">
+                    <a:lumMod val="75000"/>
+                  </a:schemeClr>
+                </a:solidFill>
+              </a:rPr>
+              <a:t>               	if (!</a:t>
+            </a:r>
+            <a:r>
+              <a:rPr lang="en-US" sz="8000" dirty="0" err="1">
+                <a:solidFill>
+                  <a:schemeClr val="accent1">
+                    <a:lumMod val="75000"/>
+                  </a:schemeClr>
+                </a:solidFill>
+              </a:rPr>
+              <a:t>hasValue</a:t>
+            </a:r>
+            <a:r>
+              <a:rPr lang="en-US" sz="8000" dirty="0">
+                <a:solidFill>
+                  <a:schemeClr val="accent1">
+                    <a:lumMod val="75000"/>
+                  </a:schemeClr>
+                </a:solidFill>
+              </a:rPr>
+              <a:t>) { throw new </a:t>
+            </a:r>
+            <a:r>
+              <a:rPr lang="en-US" sz="8000" dirty="0" err="1">
+                <a:solidFill>
+                  <a:schemeClr val="accent1">
+                    <a:lumMod val="75000"/>
+                  </a:schemeClr>
+                </a:solidFill>
+              </a:rPr>
+              <a:t>InvalidOperationException</a:t>
+            </a:r>
+            <a:r>
+              <a:rPr lang="en-US" sz="8000" dirty="0">
+                <a:solidFill>
+                  <a:schemeClr val="accent1">
+                    <a:lumMod val="75000"/>
+                  </a:schemeClr>
+                </a:solidFill>
+              </a:rPr>
+              <a:t>(); }</a:t>
+            </a:r>
+          </a:p>
+          <a:p>
+            <a:pPr marL="0" indent="0">
+              <a:buNone/>
+            </a:pPr>
+            <a:r>
+              <a:rPr lang="en-US" sz="8000" dirty="0">
+                <a:solidFill>
+                  <a:schemeClr val="accent1">
+                    <a:lumMod val="75000"/>
+                  </a:schemeClr>
+                </a:solidFill>
+              </a:rPr>
+              <a:t>	return value;</a:t>
+            </a:r>
+          </a:p>
+          <a:p>
+            <a:pPr marL="0" indent="0">
+              <a:buNone/>
+            </a:pPr>
+            <a:r>
+              <a:rPr lang="en-US" sz="8000" dirty="0">
+                <a:solidFill>
+                  <a:schemeClr val="accent1">
+                    <a:lumMod val="75000"/>
+                  </a:schemeClr>
+                </a:solidFill>
+              </a:rPr>
+              <a:t>          }</a:t>
+            </a:r>
+          </a:p>
+          <a:p>
+            <a:pPr marL="0" indent="0">
+              <a:buNone/>
+            </a:pPr>
+            <a:r>
+              <a:rPr lang="en-US" sz="8000" dirty="0">
+                <a:solidFill>
+                  <a:schemeClr val="accent1">
+                    <a:lumMod val="75000"/>
+                  </a:schemeClr>
+                </a:solidFill>
+              </a:rPr>
+              <a:t>     }</a:t>
+            </a:r>
+          </a:p>
+          <a:p>
+            <a:pPr marL="0" indent="0">
+              <a:buNone/>
+            </a:pPr>
+            <a:r>
+              <a:rPr lang="en-US" sz="8000" dirty="0">
+                <a:solidFill>
+                  <a:schemeClr val="accent1">
+                    <a:lumMod val="75000"/>
+                  </a:schemeClr>
+                </a:solidFill>
+              </a:rPr>
+              <a:t>}</a:t>
+            </a:r>
+          </a:p>
+          <a:p>
+            <a:endParaRPr lang="en-US" sz="8000" dirty="0"/>
+          </a:p>
+        </p:txBody>
+      </p:sp>
+    </p:spTree>
+    <p:extLst>
+      <p:ext uri="{BB962C8B-B14F-4D97-AF65-F5344CB8AC3E}">
+        <p14:creationId xmlns:p14="http://schemas.microsoft.com/office/powerpoint/2010/main" val="1129108515"/>
       </p:ext>
     </p:extLst>
   </p:cSld>

</xml_diff>

<commit_message>
Cliente - Con Nullable<T>
</commit_message>
<xml_diff>
--- a/Docs/Nullable.pptx
+++ b/Docs/Nullable.pptx
@@ -5,13 +5,14 @@
     <p:sldMasterId id="2147483648" r:id="rId1"/>
   </p:sldMasterIdLst>
   <p:notesMasterIdLst>
-    <p:notesMasterId r:id="rId6"/>
+    <p:notesMasterId r:id="rId7"/>
   </p:notesMasterIdLst>
   <p:sldIdLst>
     <p:sldId id="256" r:id="rId2"/>
     <p:sldId id="257" r:id="rId3"/>
     <p:sldId id="258" r:id="rId4"/>
     <p:sldId id="259" r:id="rId5"/>
+    <p:sldId id="260" r:id="rId6"/>
   </p:sldIdLst>
   <p:sldSz cx="12192000" cy="6858000"/>
   <p:notesSz cx="6858000" cy="9144000"/>
@@ -5049,6 +5050,1172 @@
     <p:extLst>
       <p:ext uri="{BB962C8B-B14F-4D97-AF65-F5344CB8AC3E}">
         <p14:creationId xmlns:p14="http://schemas.microsoft.com/office/powerpoint/2010/main" val="1129108515"/>
+      </p:ext>
+    </p:extLst>
+  </p:cSld>
+  <p:clrMapOvr>
+    <a:masterClrMapping/>
+  </p:clrMapOvr>
+</p:sld>
+</file>
+
+<file path=ppt/slides/slide5.xml><?xml version="1.0" encoding="utf-8"?>
+<p:sld xmlns:a="http://schemas.openxmlformats.org/drawingml/2006/main" xmlns:r="http://schemas.openxmlformats.org/officeDocument/2006/relationships" xmlns:p="http://schemas.openxmlformats.org/presentationml/2006/main">
+  <p:cSld>
+    <p:spTree>
+      <p:nvGrpSpPr>
+        <p:cNvPr id="1" name=""/>
+        <p:cNvGrpSpPr/>
+        <p:nvPr/>
+      </p:nvGrpSpPr>
+      <p:grpSpPr>
+        <a:xfrm>
+          <a:off x="0" y="0"/>
+          <a:ext cx="0" cy="0"/>
+          <a:chOff x="0" y="0"/>
+          <a:chExt cx="0" cy="0"/>
+        </a:xfrm>
+      </p:grpSpPr>
+      <p:sp>
+        <p:nvSpPr>
+          <p:cNvPr id="2" name="Title 1">
+            <a:extLst>
+              <a:ext uri="{FF2B5EF4-FFF2-40B4-BE49-F238E27FC236}">
+                <a16:creationId xmlns:a16="http://schemas.microsoft.com/office/drawing/2014/main" id="{17ACCF29-CB19-9948-952F-D5711150D84F}"/>
+              </a:ext>
+            </a:extLst>
+          </p:cNvPr>
+          <p:cNvSpPr>
+            <a:spLocks noGrp="1"/>
+          </p:cNvSpPr>
+          <p:nvPr>
+            <p:ph type="title"/>
+          </p:nvPr>
+        </p:nvSpPr>
+        <p:spPr/>
+        <p:txBody>
+          <a:bodyPr/>
+          <a:lstStyle/>
+          <a:p>
+            <a:r>
+              <a:rPr lang="en-US" dirty="0" err="1"/>
+              <a:t>System.Nullable</a:t>
+            </a:r>
+            <a:r>
+              <a:rPr lang="en-US" dirty="0"/>
+              <a:t>&lt;T&gt;</a:t>
+            </a:r>
+          </a:p>
+        </p:txBody>
+      </p:sp>
+      <p:pic>
+        <p:nvPicPr>
+          <p:cNvPr id="5" name="Content Placeholder 4" descr="A screenshot of a cell phone&#10;&#10;Description automatically generated">
+            <a:extLst>
+              <a:ext uri="{FF2B5EF4-FFF2-40B4-BE49-F238E27FC236}">
+                <a16:creationId xmlns:a16="http://schemas.microsoft.com/office/drawing/2014/main" id="{A9075405-8FDC-0B4C-B980-02702C3B95C3}"/>
+              </a:ext>
+            </a:extLst>
+          </p:cNvPr>
+          <p:cNvPicPr>
+            <a:picLocks noGrp="1" noChangeAspect="1"/>
+          </p:cNvPicPr>
+          <p:nvPr>
+            <p:ph idx="1"/>
+          </p:nvPr>
+        </p:nvPicPr>
+        <p:blipFill>
+          <a:blip r:embed="rId2"/>
+          <a:stretch>
+            <a:fillRect/>
+          </a:stretch>
+        </p:blipFill>
+        <p:spPr>
+          <a:xfrm>
+            <a:off x="364761" y="2088193"/>
+            <a:ext cx="4126091" cy="3982824"/>
+          </a:xfrm>
+        </p:spPr>
+      </p:pic>
+      <p:sp>
+        <p:nvSpPr>
+          <p:cNvPr id="6" name="TextBox 5">
+            <a:extLst>
+              <a:ext uri="{FF2B5EF4-FFF2-40B4-BE49-F238E27FC236}">
+                <a16:creationId xmlns:a16="http://schemas.microsoft.com/office/drawing/2014/main" id="{BEC92572-8AE2-134B-A74A-036BB7343B86}"/>
+              </a:ext>
+            </a:extLst>
+          </p:cNvPr>
+          <p:cNvSpPr txBox="1"/>
+          <p:nvPr/>
+        </p:nvSpPr>
+        <p:spPr>
+          <a:xfrm>
+            <a:off x="4676931" y="1417337"/>
+            <a:ext cx="7150308" cy="5324535"/>
+          </a:xfrm>
+          <a:prstGeom prst="rect">
+            <a:avLst/>
+          </a:prstGeom>
+          <a:noFill/>
+        </p:spPr>
+        <p:txBody>
+          <a:bodyPr wrap="square" rtlCol="0">
+            <a:spAutoFit/>
+          </a:bodyPr>
+          <a:lstStyle/>
+          <a:p>
+            <a:r>
+              <a:rPr lang="en-US" sz="2000" dirty="0" err="1">
+                <a:solidFill>
+                  <a:schemeClr val="accent1">
+                    <a:lumMod val="75000"/>
+                  </a:schemeClr>
+                </a:solidFill>
+              </a:rPr>
+              <a:t>GetValueOrDefault</a:t>
+            </a:r>
+            <a:r>
+              <a:rPr lang="en-US" sz="2000" dirty="0">
+                <a:solidFill>
+                  <a:schemeClr val="accent1">
+                    <a:lumMod val="75000"/>
+                  </a:schemeClr>
+                </a:solidFill>
+              </a:rPr>
+              <a:t> y </a:t>
+            </a:r>
+            <a:r>
+              <a:rPr lang="en-US" sz="2000" dirty="0" err="1">
+                <a:solidFill>
+                  <a:schemeClr val="accent1">
+                    <a:lumMod val="75000"/>
+                  </a:schemeClr>
+                </a:solidFill>
+              </a:rPr>
+              <a:t>GetValueOrDefault</a:t>
+            </a:r>
+            <a:r>
+              <a:rPr lang="en-US" sz="2000" dirty="0">
+                <a:solidFill>
+                  <a:schemeClr val="accent1">
+                    <a:lumMod val="75000"/>
+                  </a:schemeClr>
+                </a:solidFill>
+              </a:rPr>
+              <a:t>(T </a:t>
+            </a:r>
+            <a:r>
+              <a:rPr lang="en-US" sz="2000" dirty="0" err="1">
+                <a:solidFill>
+                  <a:schemeClr val="accent1">
+                    <a:lumMod val="75000"/>
+                  </a:schemeClr>
+                </a:solidFill>
+              </a:rPr>
+              <a:t>defaultValue</a:t>
+            </a:r>
+            <a:r>
+              <a:rPr lang="en-US" sz="2000" dirty="0">
+                <a:solidFill>
+                  <a:schemeClr val="accent1">
+                    <a:lumMod val="75000"/>
+                  </a:schemeClr>
+                </a:solidFill>
+              </a:rPr>
+              <a:t>) </a:t>
+            </a:r>
+            <a:r>
+              <a:rPr lang="en-US" sz="2000" dirty="0" err="1">
+                <a:solidFill>
+                  <a:schemeClr val="accent1">
+                    <a:lumMod val="75000"/>
+                  </a:schemeClr>
+                </a:solidFill>
+              </a:rPr>
+              <a:t>devuelven</a:t>
+            </a:r>
+            <a:r>
+              <a:rPr lang="en-US" sz="2000" dirty="0">
+                <a:solidFill>
+                  <a:schemeClr val="accent1">
+                    <a:lumMod val="75000"/>
+                  </a:schemeClr>
+                </a:solidFill>
+              </a:rPr>
+              <a:t> Value </a:t>
+            </a:r>
+            <a:r>
+              <a:rPr lang="en-US" sz="2000" dirty="0" err="1">
+                <a:solidFill>
+                  <a:schemeClr val="accent1">
+                    <a:lumMod val="75000"/>
+                  </a:schemeClr>
+                </a:solidFill>
+              </a:rPr>
+              <a:t>si</a:t>
+            </a:r>
+            <a:r>
+              <a:rPr lang="en-US" sz="2000" dirty="0">
+                <a:solidFill>
+                  <a:schemeClr val="accent1">
+                    <a:lumMod val="75000"/>
+                  </a:schemeClr>
+                </a:solidFill>
+              </a:rPr>
+              <a:t> </a:t>
+            </a:r>
+            <a:r>
+              <a:rPr lang="en-US" sz="2000" dirty="0" err="1">
+                <a:solidFill>
+                  <a:schemeClr val="accent1">
+                    <a:lumMod val="75000"/>
+                  </a:schemeClr>
+                </a:solidFill>
+              </a:rPr>
+              <a:t>HasValue</a:t>
+            </a:r>
+            <a:r>
+              <a:rPr lang="en-US" sz="2000" dirty="0">
+                <a:solidFill>
+                  <a:schemeClr val="accent1">
+                    <a:lumMod val="75000"/>
+                  </a:schemeClr>
+                </a:solidFill>
+              </a:rPr>
+              <a:t> </a:t>
+            </a:r>
+            <a:r>
+              <a:rPr lang="en-US" sz="2000" dirty="0" err="1">
+                <a:solidFill>
+                  <a:schemeClr val="accent1">
+                    <a:lumMod val="75000"/>
+                  </a:schemeClr>
+                </a:solidFill>
+              </a:rPr>
+              <a:t>es</a:t>
+            </a:r>
+            <a:r>
+              <a:rPr lang="en-US" sz="2000" dirty="0">
+                <a:solidFill>
+                  <a:schemeClr val="accent1">
+                    <a:lumMod val="75000"/>
+                  </a:schemeClr>
+                </a:solidFill>
+              </a:rPr>
+              <a:t> True, o </a:t>
+            </a:r>
+            <a:r>
+              <a:rPr lang="en-US" sz="2000" dirty="0" err="1">
+                <a:solidFill>
+                  <a:schemeClr val="accent1">
+                    <a:lumMod val="75000"/>
+                  </a:schemeClr>
+                </a:solidFill>
+              </a:rPr>
+              <a:t>si</a:t>
+            </a:r>
+            <a:r>
+              <a:rPr lang="en-US" sz="2000" dirty="0">
+                <a:solidFill>
+                  <a:schemeClr val="accent1">
+                    <a:lumMod val="75000"/>
+                  </a:schemeClr>
+                </a:solidFill>
+              </a:rPr>
+              <a:t> </a:t>
+            </a:r>
+            <a:r>
+              <a:rPr lang="en-US" sz="2000" dirty="0" err="1">
+                <a:solidFill>
+                  <a:schemeClr val="accent1">
+                    <a:lumMod val="75000"/>
+                  </a:schemeClr>
+                </a:solidFill>
+              </a:rPr>
+              <a:t>es</a:t>
+            </a:r>
+            <a:r>
+              <a:rPr lang="en-US" sz="2000" dirty="0">
+                <a:solidFill>
+                  <a:schemeClr val="accent1">
+                    <a:lumMod val="75000"/>
+                  </a:schemeClr>
+                </a:solidFill>
+              </a:rPr>
+              <a:t> False el default para el </a:t>
+            </a:r>
+            <a:r>
+              <a:rPr lang="en-US" sz="2000" dirty="0" err="1">
+                <a:solidFill>
+                  <a:schemeClr val="accent1">
+                    <a:lumMod val="75000"/>
+                  </a:schemeClr>
+                </a:solidFill>
+              </a:rPr>
+              <a:t>Tipo</a:t>
+            </a:r>
+            <a:r>
+              <a:rPr lang="en-US" sz="2000" dirty="0">
+                <a:solidFill>
+                  <a:schemeClr val="accent1">
+                    <a:lumMod val="75000"/>
+                  </a:schemeClr>
+                </a:solidFill>
+              </a:rPr>
+              <a:t> </a:t>
+            </a:r>
+            <a:r>
+              <a:rPr lang="en-US" sz="2000" dirty="0" err="1">
+                <a:solidFill>
+                  <a:schemeClr val="accent1">
+                    <a:lumMod val="75000"/>
+                  </a:schemeClr>
+                </a:solidFill>
+              </a:rPr>
+              <a:t>correspondiente</a:t>
+            </a:r>
+            <a:r>
+              <a:rPr lang="en-US" sz="2000" dirty="0">
+                <a:solidFill>
+                  <a:schemeClr val="accent1">
+                    <a:lumMod val="75000"/>
+                  </a:schemeClr>
+                </a:solidFill>
+              </a:rPr>
+              <a:t> o el valor </a:t>
+            </a:r>
+            <a:r>
+              <a:rPr lang="en-US" sz="2000" dirty="0" err="1">
+                <a:solidFill>
+                  <a:schemeClr val="accent1">
+                    <a:lumMod val="75000"/>
+                  </a:schemeClr>
+                </a:solidFill>
+              </a:rPr>
+              <a:t>pasado</a:t>
+            </a:r>
+            <a:r>
+              <a:rPr lang="en-US" sz="2000" dirty="0">
+                <a:solidFill>
+                  <a:schemeClr val="accent1">
+                    <a:lumMod val="75000"/>
+                  </a:schemeClr>
+                </a:solidFill>
+              </a:rPr>
+              <a:t> </a:t>
+            </a:r>
+            <a:r>
+              <a:rPr lang="en-US" sz="2000" dirty="0" err="1">
+                <a:solidFill>
+                  <a:schemeClr val="accent1">
+                    <a:lumMod val="75000"/>
+                  </a:schemeClr>
+                </a:solidFill>
+              </a:rPr>
+              <a:t>como</a:t>
+            </a:r>
+            <a:r>
+              <a:rPr lang="en-US" sz="2000" dirty="0">
+                <a:solidFill>
+                  <a:schemeClr val="accent1">
+                    <a:lumMod val="75000"/>
+                  </a:schemeClr>
+                </a:solidFill>
+              </a:rPr>
+              <a:t> </a:t>
+            </a:r>
+            <a:r>
+              <a:rPr lang="en-US" sz="2000" dirty="0" err="1">
+                <a:solidFill>
+                  <a:schemeClr val="accent1">
+                    <a:lumMod val="75000"/>
+                  </a:schemeClr>
+                </a:solidFill>
+              </a:rPr>
+              <a:t>argumento</a:t>
+            </a:r>
+            <a:endParaRPr lang="en-US" sz="2000" dirty="0">
+              <a:solidFill>
+                <a:schemeClr val="accent1">
+                  <a:lumMod val="75000"/>
+                </a:schemeClr>
+              </a:solidFill>
+            </a:endParaRPr>
+          </a:p>
+          <a:p>
+            <a:endParaRPr lang="en-US" sz="2000" dirty="0">
+              <a:solidFill>
+                <a:schemeClr val="accent1">
+                  <a:lumMod val="75000"/>
+                </a:schemeClr>
+              </a:solidFill>
+            </a:endParaRPr>
+          </a:p>
+          <a:p>
+            <a:r>
+              <a:rPr lang="en-US" sz="2000" dirty="0">
+                <a:solidFill>
+                  <a:schemeClr val="accent1">
+                    <a:lumMod val="75000"/>
+                  </a:schemeClr>
+                </a:solidFill>
+              </a:rPr>
+              <a:t>Hay un </a:t>
+            </a:r>
+            <a:r>
+              <a:rPr lang="en-US" sz="2000" dirty="0" err="1">
+                <a:solidFill>
+                  <a:schemeClr val="accent1">
+                    <a:lumMod val="75000"/>
+                  </a:schemeClr>
+                </a:solidFill>
+              </a:rPr>
+              <a:t>manejo</a:t>
+            </a:r>
+            <a:r>
+              <a:rPr lang="en-US" sz="2000" dirty="0">
+                <a:solidFill>
+                  <a:schemeClr val="accent1">
+                    <a:lumMod val="75000"/>
+                  </a:schemeClr>
+                </a:solidFill>
+              </a:rPr>
+              <a:t> del Overloading de </a:t>
+            </a:r>
+            <a:r>
+              <a:rPr lang="en-US" sz="2000" dirty="0" err="1">
+                <a:solidFill>
+                  <a:schemeClr val="accent1">
+                    <a:lumMod val="75000"/>
+                  </a:schemeClr>
+                </a:solidFill>
+              </a:rPr>
+              <a:t>operadores</a:t>
+            </a:r>
+            <a:r>
+              <a:rPr lang="en-US" sz="2000" dirty="0">
+                <a:solidFill>
+                  <a:schemeClr val="accent1">
+                    <a:lumMod val="75000"/>
+                  </a:schemeClr>
+                </a:solidFill>
+              </a:rPr>
+              <a:t> para Nullable&lt;T&gt;, para que </a:t>
+            </a:r>
+            <a:r>
+              <a:rPr lang="en-US" sz="2000" dirty="0" err="1">
+                <a:solidFill>
+                  <a:schemeClr val="accent1">
+                    <a:lumMod val="75000"/>
+                  </a:schemeClr>
+                </a:solidFill>
+              </a:rPr>
+              <a:t>funcionen</a:t>
+            </a:r>
+            <a:r>
+              <a:rPr lang="en-US" sz="2000" dirty="0">
+                <a:solidFill>
+                  <a:schemeClr val="accent1">
+                    <a:lumMod val="75000"/>
+                  </a:schemeClr>
+                </a:solidFill>
+              </a:rPr>
+              <a:t> </a:t>
+            </a:r>
+            <a:r>
+              <a:rPr lang="en-US" sz="2000" dirty="0" err="1">
+                <a:solidFill>
+                  <a:schemeClr val="accent1">
+                    <a:lumMod val="75000"/>
+                  </a:schemeClr>
+                </a:solidFill>
+              </a:rPr>
+              <a:t>adecuadamente</a:t>
+            </a:r>
+            <a:r>
+              <a:rPr lang="en-US" sz="2000" dirty="0">
+                <a:solidFill>
+                  <a:schemeClr val="accent1">
+                    <a:lumMod val="75000"/>
+                  </a:schemeClr>
+                </a:solidFill>
+              </a:rPr>
+              <a:t> </a:t>
+            </a:r>
+            <a:r>
+              <a:rPr lang="en-US" sz="2000" dirty="0" err="1">
+                <a:solidFill>
+                  <a:schemeClr val="accent1">
+                    <a:lumMod val="75000"/>
+                  </a:schemeClr>
+                </a:solidFill>
+              </a:rPr>
+              <a:t>sobre</a:t>
+            </a:r>
+            <a:r>
+              <a:rPr lang="en-US" sz="2000" dirty="0">
+                <a:solidFill>
+                  <a:schemeClr val="accent1">
+                    <a:lumMod val="75000"/>
+                  </a:schemeClr>
+                </a:solidFill>
+              </a:rPr>
+              <a:t> Value </a:t>
+            </a:r>
+          </a:p>
+          <a:p>
+            <a:endParaRPr lang="en-US" sz="2000" dirty="0">
+              <a:solidFill>
+                <a:schemeClr val="accent1">
+                  <a:lumMod val="75000"/>
+                </a:schemeClr>
+              </a:solidFill>
+            </a:endParaRPr>
+          </a:p>
+          <a:p>
+            <a:r>
+              <a:rPr lang="en-US" sz="2000" dirty="0">
+                <a:solidFill>
+                  <a:schemeClr val="accent1">
+                    <a:lumMod val="75000"/>
+                  </a:schemeClr>
+                </a:solidFill>
+              </a:rPr>
+              <a:t>Hay </a:t>
+            </a:r>
+            <a:r>
+              <a:rPr lang="en-US" sz="2000" dirty="0" err="1">
+                <a:solidFill>
+                  <a:schemeClr val="accent1">
+                    <a:lumMod val="75000"/>
+                  </a:schemeClr>
+                </a:solidFill>
+              </a:rPr>
+              <a:t>una</a:t>
+            </a:r>
+            <a:r>
+              <a:rPr lang="en-US" sz="2000" dirty="0">
+                <a:solidFill>
+                  <a:schemeClr val="accent1">
+                    <a:lumMod val="75000"/>
+                  </a:schemeClr>
+                </a:solidFill>
+              </a:rPr>
+              <a:t> conversion </a:t>
+            </a:r>
+            <a:r>
+              <a:rPr lang="en-US" sz="2000" dirty="0" err="1">
+                <a:solidFill>
+                  <a:schemeClr val="accent1">
+                    <a:lumMod val="75000"/>
+                  </a:schemeClr>
+                </a:solidFill>
+              </a:rPr>
+              <a:t>implícita</a:t>
+            </a:r>
+            <a:r>
+              <a:rPr lang="en-US" sz="2000" dirty="0">
+                <a:solidFill>
+                  <a:schemeClr val="accent1">
+                    <a:lumMod val="75000"/>
+                  </a:schemeClr>
+                </a:solidFill>
+              </a:rPr>
+              <a:t> de T a Nullable&lt;T&gt;, </a:t>
+            </a:r>
+            <a:r>
+              <a:rPr lang="en-US" sz="2000" dirty="0" err="1">
+                <a:solidFill>
+                  <a:schemeClr val="accent1">
+                    <a:lumMod val="75000"/>
+                  </a:schemeClr>
+                </a:solidFill>
+              </a:rPr>
+              <a:t>incluyendo</a:t>
+            </a:r>
+            <a:r>
+              <a:rPr lang="en-US" sz="2000" dirty="0">
+                <a:solidFill>
+                  <a:schemeClr val="accent1">
+                    <a:lumMod val="75000"/>
+                  </a:schemeClr>
+                </a:solidFill>
+              </a:rPr>
+              <a:t> null</a:t>
+            </a:r>
+          </a:p>
+          <a:p>
+            <a:endParaRPr lang="en-US" sz="2000" dirty="0">
+              <a:solidFill>
+                <a:schemeClr val="accent1">
+                  <a:lumMod val="75000"/>
+                </a:schemeClr>
+              </a:solidFill>
+            </a:endParaRPr>
+          </a:p>
+          <a:p>
+            <a:r>
+              <a:rPr lang="en-US" sz="2000" dirty="0">
+                <a:solidFill>
+                  <a:schemeClr val="accent1">
+                    <a:lumMod val="75000"/>
+                  </a:schemeClr>
+                </a:solidFill>
+              </a:rPr>
+              <a:t>Hay </a:t>
+            </a:r>
+            <a:r>
+              <a:rPr lang="en-US" sz="2000" dirty="0" err="1">
+                <a:solidFill>
+                  <a:schemeClr val="accent1">
+                    <a:lumMod val="75000"/>
+                  </a:schemeClr>
+                </a:solidFill>
+              </a:rPr>
+              <a:t>una</a:t>
+            </a:r>
+            <a:r>
+              <a:rPr lang="en-US" sz="2000" dirty="0">
+                <a:solidFill>
+                  <a:schemeClr val="accent1">
+                    <a:lumMod val="75000"/>
+                  </a:schemeClr>
+                </a:solidFill>
+              </a:rPr>
+              <a:t> conversion </a:t>
+            </a:r>
+            <a:r>
+              <a:rPr lang="en-US" sz="2000" dirty="0" err="1">
+                <a:solidFill>
+                  <a:schemeClr val="accent1">
+                    <a:lumMod val="75000"/>
+                  </a:schemeClr>
+                </a:solidFill>
+              </a:rPr>
+              <a:t>explícita</a:t>
+            </a:r>
+            <a:r>
+              <a:rPr lang="en-US" sz="2000" dirty="0">
+                <a:solidFill>
+                  <a:schemeClr val="accent1">
+                    <a:lumMod val="75000"/>
+                  </a:schemeClr>
+                </a:solidFill>
+              </a:rPr>
+              <a:t> de Nullable&lt;T&gt; a T, que </a:t>
+            </a:r>
+            <a:r>
+              <a:rPr lang="en-US" sz="2000" dirty="0" err="1">
+                <a:solidFill>
+                  <a:schemeClr val="accent1">
+                    <a:lumMod val="75000"/>
+                  </a:schemeClr>
+                </a:solidFill>
+              </a:rPr>
+              <a:t>dispara</a:t>
+            </a:r>
+            <a:r>
+              <a:rPr lang="en-US" sz="2000" dirty="0">
+                <a:solidFill>
+                  <a:schemeClr val="accent1">
+                    <a:lumMod val="75000"/>
+                  </a:schemeClr>
+                </a:solidFill>
+              </a:rPr>
+              <a:t> </a:t>
+            </a:r>
+            <a:r>
+              <a:rPr lang="en-US" sz="2000" dirty="0" err="1">
+                <a:solidFill>
+                  <a:schemeClr val="accent1">
+                    <a:lumMod val="75000"/>
+                  </a:schemeClr>
+                </a:solidFill>
+              </a:rPr>
+              <a:t>una</a:t>
+            </a:r>
+            <a:r>
+              <a:rPr lang="en-US" sz="2000" dirty="0">
+                <a:solidFill>
+                  <a:schemeClr val="accent1">
+                    <a:lumMod val="75000"/>
+                  </a:schemeClr>
+                </a:solidFill>
+              </a:rPr>
+              <a:t> </a:t>
+            </a:r>
+            <a:r>
+              <a:rPr lang="en-US" sz="2000" dirty="0" err="1">
+                <a:solidFill>
+                  <a:schemeClr val="accent1">
+                    <a:lumMod val="75000"/>
+                  </a:schemeClr>
+                </a:solidFill>
+              </a:rPr>
+              <a:t>InvalidOperationException</a:t>
+            </a:r>
+            <a:r>
+              <a:rPr lang="en-US" sz="2000" dirty="0">
+                <a:solidFill>
+                  <a:schemeClr val="accent1">
+                    <a:lumMod val="75000"/>
+                  </a:schemeClr>
+                </a:solidFill>
+              </a:rPr>
+              <a:t> </a:t>
+            </a:r>
+            <a:r>
+              <a:rPr lang="en-US" sz="2000" dirty="0" err="1">
+                <a:solidFill>
+                  <a:schemeClr val="accent1">
+                    <a:lumMod val="75000"/>
+                  </a:schemeClr>
+                </a:solidFill>
+              </a:rPr>
+              <a:t>en</a:t>
+            </a:r>
+            <a:r>
+              <a:rPr lang="en-US" sz="2000" dirty="0">
+                <a:solidFill>
+                  <a:schemeClr val="accent1">
+                    <a:lumMod val="75000"/>
+                  </a:schemeClr>
+                </a:solidFill>
+              </a:rPr>
+              <a:t> </a:t>
+            </a:r>
+            <a:r>
+              <a:rPr lang="en-US" sz="2000" dirty="0" err="1">
+                <a:solidFill>
+                  <a:schemeClr val="accent1">
+                    <a:lumMod val="75000"/>
+                  </a:schemeClr>
+                </a:solidFill>
+              </a:rPr>
+              <a:t>caso</a:t>
+            </a:r>
+            <a:r>
+              <a:rPr lang="en-US" sz="2000" dirty="0">
+                <a:solidFill>
+                  <a:schemeClr val="accent1">
+                    <a:lumMod val="75000"/>
+                  </a:schemeClr>
+                </a:solidFill>
+              </a:rPr>
+              <a:t> de </a:t>
+            </a:r>
+            <a:r>
+              <a:rPr lang="en-US" sz="2000" dirty="0" err="1">
+                <a:solidFill>
+                  <a:schemeClr val="accent1">
+                    <a:lumMod val="75000"/>
+                  </a:schemeClr>
+                </a:solidFill>
+              </a:rPr>
+              <a:t>haber</a:t>
+            </a:r>
+            <a:r>
+              <a:rPr lang="en-US" sz="2000" dirty="0">
+                <a:solidFill>
+                  <a:schemeClr val="accent1">
+                    <a:lumMod val="75000"/>
+                  </a:schemeClr>
+                </a:solidFill>
+              </a:rPr>
+              <a:t> un error de casting.</a:t>
+            </a:r>
+          </a:p>
+          <a:p>
+            <a:endParaRPr lang="en-US" sz="2000" dirty="0">
+              <a:solidFill>
+                <a:schemeClr val="accent1">
+                  <a:lumMod val="75000"/>
+                </a:schemeClr>
+              </a:solidFill>
+            </a:endParaRPr>
+          </a:p>
+          <a:p>
+            <a:r>
+              <a:rPr lang="en-US" sz="2000" dirty="0">
+                <a:solidFill>
+                  <a:schemeClr val="accent1">
+                    <a:lumMod val="75000"/>
+                  </a:schemeClr>
+                </a:solidFill>
+              </a:rPr>
+              <a:t>El CLR </a:t>
+            </a:r>
+            <a:r>
+              <a:rPr lang="en-US" sz="2000" dirty="0" err="1">
+                <a:solidFill>
+                  <a:schemeClr val="accent1">
+                    <a:lumMod val="75000"/>
+                  </a:schemeClr>
+                </a:solidFill>
+              </a:rPr>
+              <a:t>soporta</a:t>
+            </a:r>
+            <a:r>
+              <a:rPr lang="en-US" sz="2000" dirty="0">
+                <a:solidFill>
+                  <a:schemeClr val="accent1">
+                    <a:lumMod val="75000"/>
+                  </a:schemeClr>
+                </a:solidFill>
+              </a:rPr>
+              <a:t> </a:t>
+            </a:r>
+            <a:r>
+              <a:rPr lang="en-US" sz="2000" dirty="0" err="1">
+                <a:solidFill>
+                  <a:schemeClr val="accent1">
+                    <a:lumMod val="75000"/>
+                  </a:schemeClr>
+                </a:solidFill>
+              </a:rPr>
+              <a:t>aspectos</a:t>
+            </a:r>
+            <a:r>
+              <a:rPr lang="en-US" sz="2000" dirty="0">
+                <a:solidFill>
+                  <a:schemeClr val="accent1">
+                    <a:lumMod val="75000"/>
+                  </a:schemeClr>
+                </a:solidFill>
+              </a:rPr>
+              <a:t> </a:t>
+            </a:r>
+            <a:r>
+              <a:rPr lang="en-US" sz="2000" dirty="0" err="1">
+                <a:solidFill>
+                  <a:schemeClr val="accent1">
+                    <a:lumMod val="75000"/>
+                  </a:schemeClr>
+                </a:solidFill>
+              </a:rPr>
+              <a:t>como</a:t>
+            </a:r>
+            <a:r>
+              <a:rPr lang="en-US" sz="2000" dirty="0">
+                <a:solidFill>
+                  <a:schemeClr val="accent1">
+                    <a:lumMod val="75000"/>
+                  </a:schemeClr>
+                </a:solidFill>
+              </a:rPr>
+              <a:t> el constraint solo para </a:t>
+            </a:r>
+            <a:r>
+              <a:rPr lang="en-US" sz="2000" dirty="0" err="1">
+                <a:solidFill>
+                  <a:schemeClr val="accent1">
+                    <a:lumMod val="75000"/>
+                  </a:schemeClr>
+                </a:solidFill>
+              </a:rPr>
+              <a:t>estructuras</a:t>
+            </a:r>
+            <a:r>
+              <a:rPr lang="en-US" sz="2000" dirty="0">
+                <a:solidFill>
+                  <a:schemeClr val="accent1">
+                    <a:lumMod val="75000"/>
+                  </a:schemeClr>
+                </a:solidFill>
+              </a:rPr>
+              <a:t> y el boxing</a:t>
+            </a:r>
+          </a:p>
+          <a:p>
+            <a:endParaRPr lang="en-US" sz="2000" dirty="0">
+              <a:solidFill>
+                <a:schemeClr val="accent1">
+                  <a:lumMod val="75000"/>
+                </a:schemeClr>
+              </a:solidFill>
+            </a:endParaRPr>
+          </a:p>
+          <a:p>
+            <a:r>
+              <a:rPr lang="en-US" sz="2000" dirty="0">
+                <a:solidFill>
+                  <a:schemeClr val="accent1">
+                    <a:lumMod val="75000"/>
+                  </a:schemeClr>
+                </a:solidFill>
+              </a:rPr>
+              <a:t>El </a:t>
+            </a:r>
+            <a:r>
+              <a:rPr lang="en-US" sz="2000" dirty="0" err="1">
+                <a:solidFill>
+                  <a:schemeClr val="accent1">
+                    <a:lumMod val="75000"/>
+                  </a:schemeClr>
+                </a:solidFill>
+              </a:rPr>
+              <a:t>lenguaje</a:t>
+            </a:r>
+            <a:r>
+              <a:rPr lang="en-US" sz="2000" dirty="0">
+                <a:solidFill>
+                  <a:schemeClr val="accent1">
+                    <a:lumMod val="75000"/>
+                  </a:schemeClr>
+                </a:solidFill>
+              </a:rPr>
+              <a:t> C# </a:t>
+            </a:r>
+            <a:r>
+              <a:rPr lang="en-US" sz="2000" dirty="0" err="1">
+                <a:solidFill>
+                  <a:schemeClr val="accent1">
+                    <a:lumMod val="75000"/>
+                  </a:schemeClr>
+                </a:solidFill>
+              </a:rPr>
+              <a:t>agrega</a:t>
+            </a:r>
+            <a:r>
+              <a:rPr lang="en-US" sz="2000" dirty="0">
+                <a:solidFill>
+                  <a:schemeClr val="accent1">
+                    <a:lumMod val="75000"/>
+                  </a:schemeClr>
+                </a:solidFill>
+              </a:rPr>
+              <a:t> </a:t>
+            </a:r>
+            <a:r>
+              <a:rPr lang="en-US" sz="2000" dirty="0" err="1">
+                <a:solidFill>
+                  <a:schemeClr val="accent1">
+                    <a:lumMod val="75000"/>
+                  </a:schemeClr>
+                </a:solidFill>
+              </a:rPr>
+              <a:t>ayudas</a:t>
+            </a:r>
+            <a:r>
+              <a:rPr lang="en-US" sz="2000" dirty="0">
+                <a:solidFill>
+                  <a:schemeClr val="accent1">
+                    <a:lumMod val="75000"/>
+                  </a:schemeClr>
+                </a:solidFill>
+              </a:rPr>
+              <a:t> de </a:t>
+            </a:r>
+            <a:r>
+              <a:rPr lang="en-US" sz="2000" dirty="0" err="1">
+                <a:solidFill>
+                  <a:schemeClr val="accent1">
+                    <a:lumMod val="75000"/>
+                  </a:schemeClr>
+                </a:solidFill>
+              </a:rPr>
+              <a:t>sintáxis</a:t>
+            </a:r>
+            <a:r>
+              <a:rPr lang="en-US" sz="2000" dirty="0">
+                <a:solidFill>
+                  <a:schemeClr val="accent1">
+                    <a:lumMod val="75000"/>
+                  </a:schemeClr>
+                </a:solidFill>
+              </a:rPr>
+              <a:t> para </a:t>
+            </a:r>
+            <a:r>
+              <a:rPr lang="en-US" sz="2000" dirty="0" err="1">
+                <a:solidFill>
+                  <a:schemeClr val="accent1">
+                    <a:lumMod val="75000"/>
+                  </a:schemeClr>
+                </a:solidFill>
+              </a:rPr>
+              <a:t>manejar</a:t>
+            </a:r>
+            <a:r>
+              <a:rPr lang="en-US" sz="2000" dirty="0">
+                <a:solidFill>
+                  <a:schemeClr val="accent1">
+                    <a:lumMod val="75000"/>
+                  </a:schemeClr>
+                </a:solidFill>
+              </a:rPr>
+              <a:t> el </a:t>
+            </a:r>
+            <a:r>
+              <a:rPr lang="en-US" sz="2000" dirty="0" err="1">
+                <a:solidFill>
+                  <a:schemeClr val="accent1">
+                    <a:lumMod val="75000"/>
+                  </a:schemeClr>
+                </a:solidFill>
+              </a:rPr>
+              <a:t>tipo</a:t>
+            </a:r>
+            <a:r>
+              <a:rPr lang="en-US" sz="2000" dirty="0">
+                <a:solidFill>
+                  <a:schemeClr val="accent1">
+                    <a:lumMod val="75000"/>
+                  </a:schemeClr>
+                </a:solidFill>
+              </a:rPr>
+              <a:t> Nullable&lt;T&gt; de </a:t>
+            </a:r>
+            <a:r>
+              <a:rPr lang="en-US" sz="2000" dirty="0" err="1">
+                <a:solidFill>
+                  <a:schemeClr val="accent1">
+                    <a:lumMod val="75000"/>
+                  </a:schemeClr>
+                </a:solidFill>
+              </a:rPr>
+              <a:t>una</a:t>
+            </a:r>
+            <a:r>
+              <a:rPr lang="en-US" sz="2000" dirty="0">
+                <a:solidFill>
+                  <a:schemeClr val="accent1">
+                    <a:lumMod val="75000"/>
+                  </a:schemeClr>
+                </a:solidFill>
+              </a:rPr>
+              <a:t> forma </a:t>
+            </a:r>
+            <a:r>
+              <a:rPr lang="en-US" sz="2000" dirty="0" err="1">
+                <a:solidFill>
+                  <a:schemeClr val="accent1">
+                    <a:lumMod val="75000"/>
+                  </a:schemeClr>
+                </a:solidFill>
+              </a:rPr>
+              <a:t>más</a:t>
+            </a:r>
+            <a:r>
+              <a:rPr lang="en-US" sz="2000" dirty="0">
+                <a:solidFill>
+                  <a:schemeClr val="accent1">
+                    <a:lumMod val="75000"/>
+                  </a:schemeClr>
+                </a:solidFill>
+              </a:rPr>
+              <a:t> compacta </a:t>
+            </a:r>
+          </a:p>
+        </p:txBody>
+      </p:sp>
+      <p:sp>
+        <p:nvSpPr>
+          <p:cNvPr id="7" name="Rectangle 6">
+            <a:extLst>
+              <a:ext uri="{FF2B5EF4-FFF2-40B4-BE49-F238E27FC236}">
+                <a16:creationId xmlns:a16="http://schemas.microsoft.com/office/drawing/2014/main" id="{F1E86271-3211-1D49-8C3C-DE1BA729009B}"/>
+              </a:ext>
+            </a:extLst>
+          </p:cNvPr>
+          <p:cNvSpPr/>
+          <p:nvPr/>
+        </p:nvSpPr>
+        <p:spPr>
+          <a:xfrm>
+            <a:off x="974361" y="4304860"/>
+            <a:ext cx="3516491" cy="558384"/>
+          </a:xfrm>
+          <a:prstGeom prst="rect">
+            <a:avLst/>
+          </a:prstGeom>
+          <a:solidFill>
+            <a:schemeClr val="accent1">
+              <a:alpha val="50000"/>
+            </a:schemeClr>
+          </a:solidFill>
+        </p:spPr>
+        <p:style>
+          <a:lnRef idx="2">
+            <a:schemeClr val="accent1">
+              <a:shade val="50000"/>
+            </a:schemeClr>
+          </a:lnRef>
+          <a:fillRef idx="1">
+            <a:schemeClr val="accent1"/>
+          </a:fillRef>
+          <a:effectRef idx="0">
+            <a:schemeClr val="accent1"/>
+          </a:effectRef>
+          <a:fontRef idx="minor">
+            <a:schemeClr val="lt1"/>
+          </a:fontRef>
+        </p:style>
+        <p:txBody>
+          <a:bodyPr rtlCol="0" anchor="ctr"/>
+          <a:lstStyle/>
+          <a:p>
+            <a:pPr algn="ctr"/>
+            <a:endParaRPr lang="en-US"/>
+          </a:p>
+        </p:txBody>
+      </p:sp>
+      <p:sp>
+        <p:nvSpPr>
+          <p:cNvPr id="8" name="Rectangle 7">
+            <a:extLst>
+              <a:ext uri="{FF2B5EF4-FFF2-40B4-BE49-F238E27FC236}">
+                <a16:creationId xmlns:a16="http://schemas.microsoft.com/office/drawing/2014/main" id="{EECA0F1B-D440-2749-BDC4-0F43EEE5DF9E}"/>
+              </a:ext>
+            </a:extLst>
+          </p:cNvPr>
+          <p:cNvSpPr/>
+          <p:nvPr/>
+        </p:nvSpPr>
+        <p:spPr>
+          <a:xfrm>
+            <a:off x="974361" y="3788764"/>
+            <a:ext cx="3516491" cy="558384"/>
+          </a:xfrm>
+          <a:prstGeom prst="rect">
+            <a:avLst/>
+          </a:prstGeom>
+          <a:solidFill>
+            <a:schemeClr val="accent1">
+              <a:alpha val="50000"/>
+            </a:schemeClr>
+          </a:solidFill>
+        </p:spPr>
+        <p:style>
+          <a:lnRef idx="2">
+            <a:schemeClr val="accent1">
+              <a:shade val="50000"/>
+            </a:schemeClr>
+          </a:lnRef>
+          <a:fillRef idx="1">
+            <a:schemeClr val="accent1"/>
+          </a:fillRef>
+          <a:effectRef idx="0">
+            <a:schemeClr val="accent1"/>
+          </a:effectRef>
+          <a:fontRef idx="minor">
+            <a:schemeClr val="lt1"/>
+          </a:fontRef>
+        </p:style>
+        <p:txBody>
+          <a:bodyPr rtlCol="0" anchor="ctr"/>
+          <a:lstStyle/>
+          <a:p>
+            <a:pPr algn="ctr"/>
+            <a:endParaRPr lang="en-US"/>
+          </a:p>
+        </p:txBody>
+      </p:sp>
+    </p:spTree>
+    <p:extLst>
+      <p:ext uri="{BB962C8B-B14F-4D97-AF65-F5344CB8AC3E}">
+        <p14:creationId xmlns:p14="http://schemas.microsoft.com/office/powerpoint/2010/main" val="1837084379"/>
       </p:ext>
     </p:extLst>
   </p:cSld>

</xml_diff>

<commit_message>
Cliente - Nullable con conversiones y operadores
</commit_message>
<xml_diff>
--- a/Docs/Nullable.pptx
+++ b/Docs/Nullable.pptx
@@ -627,6 +627,90 @@
     <p:extLst>
       <p:ext uri="{BB962C8B-B14F-4D97-AF65-F5344CB8AC3E}">
         <p14:creationId xmlns:p14="http://schemas.microsoft.com/office/powerpoint/2010/main" val="1524559138"/>
+      </p:ext>
+    </p:extLst>
+  </p:cSld>
+  <p:clrMapOvr>
+    <a:masterClrMapping/>
+  </p:clrMapOvr>
+</p:notes>
+</file>
+
+<file path=ppt/notesSlides/notesSlide3.xml><?xml version="1.0" encoding="utf-8"?>
+<p:notes xmlns:a="http://schemas.openxmlformats.org/drawingml/2006/main" xmlns:r="http://schemas.openxmlformats.org/officeDocument/2006/relationships" xmlns:p="http://schemas.openxmlformats.org/presentationml/2006/main">
+  <p:cSld>
+    <p:spTree>
+      <p:nvGrpSpPr>
+        <p:cNvPr id="1" name=""/>
+        <p:cNvGrpSpPr/>
+        <p:nvPr/>
+      </p:nvGrpSpPr>
+      <p:grpSpPr>
+        <a:xfrm>
+          <a:off x="0" y="0"/>
+          <a:ext cx="0" cy="0"/>
+          <a:chOff x="0" y="0"/>
+          <a:chExt cx="0" cy="0"/>
+        </a:xfrm>
+      </p:grpSpPr>
+      <p:sp>
+        <p:nvSpPr>
+          <p:cNvPr id="2" name="Slide Image Placeholder 1"/>
+          <p:cNvSpPr>
+            <a:spLocks noGrp="1" noRot="1" noChangeAspect="1"/>
+          </p:cNvSpPr>
+          <p:nvPr>
+            <p:ph type="sldImg"/>
+          </p:nvPr>
+        </p:nvSpPr>
+        <p:spPr/>
+      </p:sp>
+      <p:sp>
+        <p:nvSpPr>
+          <p:cNvPr id="3" name="Notes Placeholder 2"/>
+          <p:cNvSpPr>
+            <a:spLocks noGrp="1"/>
+          </p:cNvSpPr>
+          <p:nvPr>
+            <p:ph type="body" idx="1"/>
+          </p:nvPr>
+        </p:nvSpPr>
+        <p:spPr/>
+        <p:txBody>
+          <a:bodyPr/>
+          <a:lstStyle/>
+          <a:p>
+            <a:endParaRPr lang="en-US" dirty="0"/>
+          </a:p>
+        </p:txBody>
+      </p:sp>
+      <p:sp>
+        <p:nvSpPr>
+          <p:cNvPr id="4" name="Slide Number Placeholder 3"/>
+          <p:cNvSpPr>
+            <a:spLocks noGrp="1"/>
+          </p:cNvSpPr>
+          <p:nvPr>
+            <p:ph type="sldNum" sz="quarter" idx="5"/>
+          </p:nvPr>
+        </p:nvSpPr>
+        <p:spPr/>
+        <p:txBody>
+          <a:bodyPr/>
+          <a:lstStyle/>
+          <a:p>
+            <a:fld id="{4A31E6D3-B1EF-1C4E-BEF7-C02D79579CFC}" type="slidenum">
+              <a:rPr lang="en-US" smtClean="0"/>
+              <a:t>5</a:t>
+            </a:fld>
+            <a:endParaRPr lang="en-US"/>
+          </a:p>
+        </p:txBody>
+      </p:sp>
+    </p:spTree>
+    <p:extLst>
+      <p:ext uri="{BB962C8B-B14F-4D97-AF65-F5344CB8AC3E}">
+        <p14:creationId xmlns:p14="http://schemas.microsoft.com/office/powerpoint/2010/main" val="2198642224"/>
       </p:ext>
     </p:extLst>
   </p:cSld>
@@ -5125,7 +5209,7 @@
           </p:nvPr>
         </p:nvPicPr>
         <p:blipFill>
-          <a:blip r:embed="rId2"/>
+          <a:blip r:embed="rId3"/>
           <a:stretch>
             <a:fillRect/>
           </a:stretch>

</xml_diff>

<commit_message>
Cliente - Nullable con ?
</commit_message>
<xml_diff>
--- a/Docs/Nullable.pptx
+++ b/Docs/Nullable.pptx
@@ -5,7 +5,7 @@
     <p:sldMasterId id="2147483648" r:id="rId1"/>
   </p:sldMasterIdLst>
   <p:notesMasterIdLst>
-    <p:notesMasterId r:id="rId7"/>
+    <p:notesMasterId r:id="rId8"/>
   </p:notesMasterIdLst>
   <p:sldIdLst>
     <p:sldId id="256" r:id="rId2"/>
@@ -13,6 +13,7 @@
     <p:sldId id="258" r:id="rId4"/>
     <p:sldId id="259" r:id="rId5"/>
     <p:sldId id="260" r:id="rId6"/>
+    <p:sldId id="261" r:id="rId7"/>
   </p:sldIdLst>
   <p:sldSz cx="12192000" cy="6858000"/>
   <p:notesSz cx="6858000" cy="9144000"/>
@@ -6300,6 +6301,205 @@
     <p:extLst>
       <p:ext uri="{BB962C8B-B14F-4D97-AF65-F5344CB8AC3E}">
         <p14:creationId xmlns:p14="http://schemas.microsoft.com/office/powerpoint/2010/main" val="1837084379"/>
+      </p:ext>
+    </p:extLst>
+  </p:cSld>
+  <p:clrMapOvr>
+    <a:masterClrMapping/>
+  </p:clrMapOvr>
+</p:sld>
+</file>
+
+<file path=ppt/slides/slide6.xml><?xml version="1.0" encoding="utf-8"?>
+<p:sld xmlns:a="http://schemas.openxmlformats.org/drawingml/2006/main" xmlns:r="http://schemas.openxmlformats.org/officeDocument/2006/relationships" xmlns:p="http://schemas.openxmlformats.org/presentationml/2006/main">
+  <p:cSld>
+    <p:spTree>
+      <p:nvGrpSpPr>
+        <p:cNvPr id="1" name=""/>
+        <p:cNvGrpSpPr/>
+        <p:nvPr/>
+      </p:nvGrpSpPr>
+      <p:grpSpPr>
+        <a:xfrm>
+          <a:off x="0" y="0"/>
+          <a:ext cx="0" cy="0"/>
+          <a:chOff x="0" y="0"/>
+          <a:chExt cx="0" cy="0"/>
+        </a:xfrm>
+      </p:grpSpPr>
+      <p:sp>
+        <p:nvSpPr>
+          <p:cNvPr id="2" name="Title 1">
+            <a:extLst>
+              <a:ext uri="{FF2B5EF4-FFF2-40B4-BE49-F238E27FC236}">
+                <a16:creationId xmlns:a16="http://schemas.microsoft.com/office/drawing/2014/main" id="{B32D0618-F2E7-9D42-9882-134102359599}"/>
+              </a:ext>
+            </a:extLst>
+          </p:cNvPr>
+          <p:cNvSpPr>
+            <a:spLocks noGrp="1"/>
+          </p:cNvSpPr>
+          <p:nvPr>
+            <p:ph type="title"/>
+          </p:nvPr>
+        </p:nvSpPr>
+        <p:spPr/>
+        <p:txBody>
+          <a:bodyPr/>
+          <a:lstStyle/>
+          <a:p>
+            <a:r>
+              <a:rPr lang="en-US" dirty="0"/>
+              <a:t>Nullable&lt;T&gt; </a:t>
+            </a:r>
+            <a:r>
+              <a:rPr lang="en-US" dirty="0" err="1"/>
+              <a:t>ayuda</a:t>
+            </a:r>
+            <a:r>
+              <a:rPr lang="en-US" dirty="0"/>
+              <a:t> de </a:t>
+            </a:r>
+            <a:r>
+              <a:rPr lang="en-US" dirty="0" err="1"/>
+              <a:t>sintáxis</a:t>
+            </a:r>
+            <a:r>
+              <a:rPr lang="en-US" dirty="0"/>
+              <a:t> </a:t>
+            </a:r>
+            <a:r>
+              <a:rPr lang="en-US" dirty="0" err="1"/>
+              <a:t>en</a:t>
+            </a:r>
+            <a:r>
+              <a:rPr lang="en-US" dirty="0"/>
+              <a:t> C# </a:t>
+            </a:r>
+          </a:p>
+        </p:txBody>
+      </p:sp>
+      <p:sp>
+        <p:nvSpPr>
+          <p:cNvPr id="6" name="TextBox 5">
+            <a:extLst>
+              <a:ext uri="{FF2B5EF4-FFF2-40B4-BE49-F238E27FC236}">
+                <a16:creationId xmlns:a16="http://schemas.microsoft.com/office/drawing/2014/main" id="{35DB5970-0F6A-684F-BF15-E21556B59EAC}"/>
+              </a:ext>
+            </a:extLst>
+          </p:cNvPr>
+          <p:cNvSpPr txBox="1"/>
+          <p:nvPr/>
+        </p:nvSpPr>
+        <p:spPr>
+          <a:xfrm>
+            <a:off x="2533025" y="5407156"/>
+            <a:ext cx="7125950" cy="523220"/>
+          </a:xfrm>
+          <a:prstGeom prst="rect">
+            <a:avLst/>
+          </a:prstGeom>
+          <a:noFill/>
+        </p:spPr>
+        <p:txBody>
+          <a:bodyPr wrap="square" rtlCol="0">
+            <a:spAutoFit/>
+          </a:bodyPr>
+          <a:lstStyle/>
+          <a:p>
+            <a:r>
+              <a:rPr lang="en-US" sz="2800" dirty="0">
+                <a:solidFill>
+                  <a:srgbClr val="FF0000"/>
+                </a:solidFill>
+              </a:rPr>
+              <a:t>T? </a:t>
+            </a:r>
+            <a:r>
+              <a:rPr lang="en-US" sz="2800" dirty="0" err="1">
+                <a:solidFill>
+                  <a:srgbClr val="FF0000"/>
+                </a:solidFill>
+              </a:rPr>
+              <a:t>es</a:t>
+            </a:r>
+            <a:r>
+              <a:rPr lang="en-US" sz="2800" dirty="0">
+                <a:solidFill>
+                  <a:srgbClr val="FF0000"/>
+                </a:solidFill>
+              </a:rPr>
+              <a:t> </a:t>
+            </a:r>
+            <a:r>
+              <a:rPr lang="en-US" sz="2800" dirty="0" err="1">
+                <a:solidFill>
+                  <a:srgbClr val="FF0000"/>
+                </a:solidFill>
+              </a:rPr>
+              <a:t>completamente</a:t>
+            </a:r>
+            <a:r>
+              <a:rPr lang="en-US" sz="2800" dirty="0">
+                <a:solidFill>
+                  <a:srgbClr val="FF0000"/>
+                </a:solidFill>
+              </a:rPr>
+              <a:t> </a:t>
+            </a:r>
+            <a:r>
+              <a:rPr lang="en-US" sz="2800" dirty="0" err="1">
+                <a:solidFill>
+                  <a:srgbClr val="FF0000"/>
+                </a:solidFill>
+              </a:rPr>
+              <a:t>equivalente</a:t>
+            </a:r>
+            <a:r>
+              <a:rPr lang="en-US" sz="2800" dirty="0">
+                <a:solidFill>
+                  <a:srgbClr val="FF0000"/>
+                </a:solidFill>
+              </a:rPr>
+              <a:t> a Nullable&lt;T&gt;</a:t>
+            </a:r>
+          </a:p>
+        </p:txBody>
+      </p:sp>
+      <p:pic>
+        <p:nvPicPr>
+          <p:cNvPr id="8" name="Picture 7" descr="A close up of a logo&#10;&#10;Description automatically generated">
+            <a:extLst>
+              <a:ext uri="{FF2B5EF4-FFF2-40B4-BE49-F238E27FC236}">
+                <a16:creationId xmlns:a16="http://schemas.microsoft.com/office/drawing/2014/main" id="{C4DB81AF-2E89-2448-981D-AC6E7FFB0969}"/>
+              </a:ext>
+            </a:extLst>
+          </p:cNvPr>
+          <p:cNvPicPr>
+            <a:picLocks noChangeAspect="1"/>
+          </p:cNvPicPr>
+          <p:nvPr/>
+        </p:nvPicPr>
+        <p:blipFill>
+          <a:blip r:embed="rId2"/>
+          <a:stretch>
+            <a:fillRect/>
+          </a:stretch>
+        </p:blipFill>
+        <p:spPr>
+          <a:xfrm>
+            <a:off x="678601" y="2175721"/>
+            <a:ext cx="10834799" cy="2506558"/>
+          </a:xfrm>
+          <a:prstGeom prst="rect">
+            <a:avLst/>
+          </a:prstGeom>
+        </p:spPr>
+      </p:pic>
+    </p:spTree>
+    <p:extLst>
+      <p:ext uri="{BB962C8B-B14F-4D97-AF65-F5344CB8AC3E}">
+        <p14:creationId xmlns:p14="http://schemas.microsoft.com/office/powerpoint/2010/main" val="664382392"/>
       </p:ext>
     </p:extLst>
   </p:cSld>

</xml_diff>

<commit_message>
Cliente - Nullable equivalente uso de null y HasValue
</commit_message>
<xml_diff>
--- a/Docs/Nullable.pptx
+++ b/Docs/Nullable.pptx
@@ -5,7 +5,7 @@
     <p:sldMasterId id="2147483648" r:id="rId1"/>
   </p:sldMasterIdLst>
   <p:notesMasterIdLst>
-    <p:notesMasterId r:id="rId8"/>
+    <p:notesMasterId r:id="rId9"/>
   </p:notesMasterIdLst>
   <p:sldIdLst>
     <p:sldId id="256" r:id="rId2"/>
@@ -14,6 +14,7 @@
     <p:sldId id="259" r:id="rId5"/>
     <p:sldId id="260" r:id="rId6"/>
     <p:sldId id="261" r:id="rId7"/>
+    <p:sldId id="262" r:id="rId8"/>
   </p:sldIdLst>
   <p:sldSz cx="12192000" cy="6858000"/>
   <p:notesSz cx="6858000" cy="9144000"/>
@@ -202,7 +203,7 @@
           <a:p>
             <a:fld id="{3C17E8D4-202C-384A-952C-ED5C2B149F8E}" type="datetimeFigureOut">
               <a:rPr lang="en-US" smtClean="0"/>
-              <a:t>5/3/19</a:t>
+              <a:t>5/6/19</a:t>
             </a:fld>
             <a:endParaRPr lang="en-US"/>
           </a:p>
@@ -868,7 +869,7 @@
           <a:p>
             <a:fld id="{50065586-3F98-CC44-BCFC-F575C7686E1C}" type="datetimeFigureOut">
               <a:rPr lang="en-US" smtClean="0"/>
-              <a:t>5/3/19</a:t>
+              <a:t>5/6/19</a:t>
             </a:fld>
             <a:endParaRPr lang="en-US"/>
           </a:p>
@@ -1066,7 +1067,7 @@
           <a:p>
             <a:fld id="{50065586-3F98-CC44-BCFC-F575C7686E1C}" type="datetimeFigureOut">
               <a:rPr lang="en-US" smtClean="0"/>
-              <a:t>5/3/19</a:t>
+              <a:t>5/6/19</a:t>
             </a:fld>
             <a:endParaRPr lang="en-US"/>
           </a:p>
@@ -1274,7 +1275,7 @@
           <a:p>
             <a:fld id="{50065586-3F98-CC44-BCFC-F575C7686E1C}" type="datetimeFigureOut">
               <a:rPr lang="en-US" smtClean="0"/>
-              <a:t>5/3/19</a:t>
+              <a:t>5/6/19</a:t>
             </a:fld>
             <a:endParaRPr lang="en-US"/>
           </a:p>
@@ -1472,7 +1473,7 @@
           <a:p>
             <a:fld id="{50065586-3F98-CC44-BCFC-F575C7686E1C}" type="datetimeFigureOut">
               <a:rPr lang="en-US" smtClean="0"/>
-              <a:t>5/3/19</a:t>
+              <a:t>5/6/19</a:t>
             </a:fld>
             <a:endParaRPr lang="en-US"/>
           </a:p>
@@ -1747,7 +1748,7 @@
           <a:p>
             <a:fld id="{50065586-3F98-CC44-BCFC-F575C7686E1C}" type="datetimeFigureOut">
               <a:rPr lang="en-US" smtClean="0"/>
-              <a:t>5/3/19</a:t>
+              <a:t>5/6/19</a:t>
             </a:fld>
             <a:endParaRPr lang="en-US"/>
           </a:p>
@@ -2012,7 +2013,7 @@
           <a:p>
             <a:fld id="{50065586-3F98-CC44-BCFC-F575C7686E1C}" type="datetimeFigureOut">
               <a:rPr lang="en-US" smtClean="0"/>
-              <a:t>5/3/19</a:t>
+              <a:t>5/6/19</a:t>
             </a:fld>
             <a:endParaRPr lang="en-US"/>
           </a:p>
@@ -2424,7 +2425,7 @@
           <a:p>
             <a:fld id="{50065586-3F98-CC44-BCFC-F575C7686E1C}" type="datetimeFigureOut">
               <a:rPr lang="en-US" smtClean="0"/>
-              <a:t>5/3/19</a:t>
+              <a:t>5/6/19</a:t>
             </a:fld>
             <a:endParaRPr lang="en-US"/>
           </a:p>
@@ -2565,7 +2566,7 @@
           <a:p>
             <a:fld id="{50065586-3F98-CC44-BCFC-F575C7686E1C}" type="datetimeFigureOut">
               <a:rPr lang="en-US" smtClean="0"/>
-              <a:t>5/3/19</a:t>
+              <a:t>5/6/19</a:t>
             </a:fld>
             <a:endParaRPr lang="en-US"/>
           </a:p>
@@ -2678,7 +2679,7 @@
           <a:p>
             <a:fld id="{50065586-3F98-CC44-BCFC-F575C7686E1C}" type="datetimeFigureOut">
               <a:rPr lang="en-US" smtClean="0"/>
-              <a:t>5/3/19</a:t>
+              <a:t>5/6/19</a:t>
             </a:fld>
             <a:endParaRPr lang="en-US"/>
           </a:p>
@@ -2989,7 +2990,7 @@
           <a:p>
             <a:fld id="{50065586-3F98-CC44-BCFC-F575C7686E1C}" type="datetimeFigureOut">
               <a:rPr lang="en-US" smtClean="0"/>
-              <a:t>5/3/19</a:t>
+              <a:t>5/6/19</a:t>
             </a:fld>
             <a:endParaRPr lang="en-US"/>
           </a:p>
@@ -3277,7 +3278,7 @@
           <a:p>
             <a:fld id="{50065586-3F98-CC44-BCFC-F575C7686E1C}" type="datetimeFigureOut">
               <a:rPr lang="en-US" smtClean="0"/>
-              <a:t>5/3/19</a:t>
+              <a:t>5/6/19</a:t>
             </a:fld>
             <a:endParaRPr lang="en-US"/>
           </a:p>
@@ -3518,7 +3519,7 @@
           <a:p>
             <a:fld id="{50065586-3F98-CC44-BCFC-F575C7686E1C}" type="datetimeFigureOut">
               <a:rPr lang="en-US" smtClean="0"/>
-              <a:t>5/3/19</a:t>
+              <a:t>5/6/19</a:t>
             </a:fld>
             <a:endParaRPr lang="en-US"/>
           </a:p>
@@ -6500,6 +6501,1141 @@
     <p:extLst>
       <p:ext uri="{BB962C8B-B14F-4D97-AF65-F5344CB8AC3E}">
         <p14:creationId xmlns:p14="http://schemas.microsoft.com/office/powerpoint/2010/main" val="664382392"/>
+      </p:ext>
+    </p:extLst>
+  </p:cSld>
+  <p:clrMapOvr>
+    <a:masterClrMapping/>
+  </p:clrMapOvr>
+</p:sld>
+</file>
+
+<file path=ppt/slides/slide7.xml><?xml version="1.0" encoding="utf-8"?>
+<p:sld xmlns:a="http://schemas.openxmlformats.org/drawingml/2006/main" xmlns:r="http://schemas.openxmlformats.org/officeDocument/2006/relationships" xmlns:p="http://schemas.openxmlformats.org/presentationml/2006/main">
+  <p:cSld>
+    <p:spTree>
+      <p:nvGrpSpPr>
+        <p:cNvPr id="1" name=""/>
+        <p:cNvGrpSpPr/>
+        <p:nvPr/>
+      </p:nvGrpSpPr>
+      <p:grpSpPr>
+        <a:xfrm>
+          <a:off x="0" y="0"/>
+          <a:ext cx="0" cy="0"/>
+          <a:chOff x="0" y="0"/>
+          <a:chExt cx="0" cy="0"/>
+        </a:xfrm>
+      </p:grpSpPr>
+      <p:sp>
+        <p:nvSpPr>
+          <p:cNvPr id="2" name="Title 1">
+            <a:extLst>
+              <a:ext uri="{FF2B5EF4-FFF2-40B4-BE49-F238E27FC236}">
+                <a16:creationId xmlns:a16="http://schemas.microsoft.com/office/drawing/2014/main" id="{9032DB1D-DD2D-1F43-BAB2-D81D0062D13D}"/>
+              </a:ext>
+            </a:extLst>
+          </p:cNvPr>
+          <p:cNvSpPr>
+            <a:spLocks noGrp="1"/>
+          </p:cNvSpPr>
+          <p:nvPr>
+            <p:ph type="title"/>
+          </p:nvPr>
+        </p:nvSpPr>
+        <p:spPr/>
+        <p:txBody>
+          <a:bodyPr/>
+          <a:lstStyle/>
+          <a:p>
+            <a:r>
+              <a:rPr lang="en-US" dirty="0" err="1"/>
+              <a:t>Uso</a:t>
+            </a:r>
+            <a:r>
+              <a:rPr lang="en-US" dirty="0"/>
+              <a:t> de Nullable&lt;T&gt; (?)</a:t>
+            </a:r>
+          </a:p>
+        </p:txBody>
+      </p:sp>
+      <p:sp>
+        <p:nvSpPr>
+          <p:cNvPr id="3" name="Content Placeholder 2">
+            <a:extLst>
+              <a:ext uri="{FF2B5EF4-FFF2-40B4-BE49-F238E27FC236}">
+                <a16:creationId xmlns:a16="http://schemas.microsoft.com/office/drawing/2014/main" id="{C055F219-370F-8A49-BD43-A06ACC1D8974}"/>
+              </a:ext>
+            </a:extLst>
+          </p:cNvPr>
+          <p:cNvSpPr>
+            <a:spLocks noGrp="1"/>
+          </p:cNvSpPr>
+          <p:nvPr>
+            <p:ph idx="1"/>
+          </p:nvPr>
+        </p:nvSpPr>
+        <p:spPr>
+          <a:xfrm>
+            <a:off x="838200" y="1690688"/>
+            <a:ext cx="10515600" cy="4682403"/>
+          </a:xfrm>
+        </p:spPr>
+        <p:txBody>
+          <a:bodyPr>
+            <a:normAutofit lnSpcReduction="10000"/>
+          </a:bodyPr>
+          <a:lstStyle/>
+          <a:p>
+            <a:r>
+              <a:rPr lang="en-US" dirty="0" err="1">
+                <a:solidFill>
+                  <a:srgbClr val="0070C0"/>
+                </a:solidFill>
+              </a:rPr>
+              <a:t>En</a:t>
+            </a:r>
+            <a:r>
+              <a:rPr lang="en-US" dirty="0">
+                <a:solidFill>
+                  <a:srgbClr val="0070C0"/>
+                </a:solidFill>
+              </a:rPr>
+              <a:t> </a:t>
+            </a:r>
+            <a:r>
+              <a:rPr lang="en-US" dirty="0" err="1">
+                <a:solidFill>
+                  <a:srgbClr val="0070C0"/>
+                </a:solidFill>
+              </a:rPr>
+              <a:t>todos</a:t>
+            </a:r>
+            <a:r>
+              <a:rPr lang="en-US" dirty="0">
+                <a:solidFill>
+                  <a:srgbClr val="0070C0"/>
+                </a:solidFill>
+              </a:rPr>
+              <a:t> </a:t>
+            </a:r>
+            <a:r>
+              <a:rPr lang="en-US" dirty="0" err="1">
+                <a:solidFill>
+                  <a:srgbClr val="0070C0"/>
+                </a:solidFill>
+              </a:rPr>
+              <a:t>los</a:t>
+            </a:r>
+            <a:r>
+              <a:rPr lang="en-US" dirty="0">
+                <a:solidFill>
+                  <a:srgbClr val="0070C0"/>
+                </a:solidFill>
+              </a:rPr>
+              <a:t> </a:t>
+            </a:r>
+            <a:r>
+              <a:rPr lang="en-US" dirty="0" err="1">
+                <a:solidFill>
+                  <a:srgbClr val="0070C0"/>
+                </a:solidFill>
+              </a:rPr>
+              <a:t>casos</a:t>
+            </a:r>
+            <a:r>
+              <a:rPr lang="en-US" dirty="0">
+                <a:solidFill>
+                  <a:srgbClr val="0070C0"/>
+                </a:solidFill>
+              </a:rPr>
+              <a:t> </a:t>
+            </a:r>
+            <a:r>
+              <a:rPr lang="en-US" dirty="0" err="1">
+                <a:solidFill>
+                  <a:srgbClr val="0070C0"/>
+                </a:solidFill>
+              </a:rPr>
+              <a:t>donde</a:t>
+            </a:r>
+            <a:r>
+              <a:rPr lang="en-US" dirty="0">
+                <a:solidFill>
+                  <a:srgbClr val="0070C0"/>
+                </a:solidFill>
+              </a:rPr>
+              <a:t> </a:t>
+            </a:r>
+            <a:r>
+              <a:rPr lang="en-US" dirty="0" err="1">
+                <a:solidFill>
+                  <a:srgbClr val="0070C0"/>
+                </a:solidFill>
+              </a:rPr>
+              <a:t>tenemos</a:t>
+            </a:r>
+            <a:r>
+              <a:rPr lang="en-US" dirty="0">
+                <a:solidFill>
+                  <a:srgbClr val="0070C0"/>
+                </a:solidFill>
+              </a:rPr>
+              <a:t> </a:t>
+            </a:r>
+            <a:r>
+              <a:rPr lang="en-US" dirty="0" err="1">
+                <a:solidFill>
+                  <a:srgbClr val="0070C0"/>
+                </a:solidFill>
+              </a:rPr>
+              <a:t>campos</a:t>
+            </a:r>
+            <a:r>
+              <a:rPr lang="en-US" dirty="0">
+                <a:solidFill>
+                  <a:srgbClr val="0070C0"/>
+                </a:solidFill>
+              </a:rPr>
+              <a:t> o variables de </a:t>
+            </a:r>
+            <a:r>
+              <a:rPr lang="en-US" dirty="0" err="1">
+                <a:solidFill>
+                  <a:srgbClr val="FF0000"/>
+                </a:solidFill>
+              </a:rPr>
+              <a:t>tipos</a:t>
+            </a:r>
+            <a:r>
+              <a:rPr lang="en-US" dirty="0">
+                <a:solidFill>
+                  <a:srgbClr val="FF0000"/>
+                </a:solidFill>
+              </a:rPr>
+              <a:t> </a:t>
+            </a:r>
+            <a:r>
+              <a:rPr lang="en-US" dirty="0" err="1">
+                <a:solidFill>
+                  <a:srgbClr val="FF0000"/>
+                </a:solidFill>
+              </a:rPr>
+              <a:t>primitivos</a:t>
+            </a:r>
+            <a:r>
+              <a:rPr lang="en-US" dirty="0">
+                <a:solidFill>
+                  <a:srgbClr val="FF0000"/>
+                </a:solidFill>
+              </a:rPr>
+              <a:t>, </a:t>
+            </a:r>
+            <a:r>
+              <a:rPr lang="en-US" dirty="0" err="1">
+                <a:solidFill>
+                  <a:srgbClr val="FF0000"/>
+                </a:solidFill>
+              </a:rPr>
+              <a:t>enums</a:t>
+            </a:r>
+            <a:r>
+              <a:rPr lang="en-US" dirty="0">
+                <a:solidFill>
+                  <a:srgbClr val="FF0000"/>
+                </a:solidFill>
+              </a:rPr>
+              <a:t> o </a:t>
+            </a:r>
+            <a:r>
+              <a:rPr lang="en-US" dirty="0" err="1">
+                <a:solidFill>
+                  <a:srgbClr val="FF0000"/>
+                </a:solidFill>
+              </a:rPr>
+              <a:t>estructuras</a:t>
+            </a:r>
+            <a:r>
+              <a:rPr lang="en-US" dirty="0">
+                <a:solidFill>
+                  <a:srgbClr val="0070C0"/>
+                </a:solidFill>
+              </a:rPr>
+              <a:t>, que </a:t>
+            </a:r>
+            <a:r>
+              <a:rPr lang="en-US" dirty="0" err="1">
+                <a:solidFill>
+                  <a:srgbClr val="0070C0"/>
+                </a:solidFill>
+              </a:rPr>
+              <a:t>por</a:t>
+            </a:r>
+            <a:r>
+              <a:rPr lang="en-US" dirty="0">
+                <a:solidFill>
+                  <a:srgbClr val="0070C0"/>
+                </a:solidFill>
+              </a:rPr>
+              <a:t> </a:t>
+            </a:r>
+            <a:r>
+              <a:rPr lang="en-US" dirty="0" err="1">
+                <a:solidFill>
+                  <a:srgbClr val="0070C0"/>
+                </a:solidFill>
+              </a:rPr>
+              <a:t>su</a:t>
+            </a:r>
+            <a:r>
+              <a:rPr lang="en-US" dirty="0">
+                <a:solidFill>
+                  <a:srgbClr val="0070C0"/>
+                </a:solidFill>
+              </a:rPr>
+              <a:t> forma de </a:t>
+            </a:r>
+            <a:r>
+              <a:rPr lang="en-US" dirty="0" err="1">
+                <a:solidFill>
+                  <a:srgbClr val="0070C0"/>
+                </a:solidFill>
+              </a:rPr>
+              <a:t>manejo</a:t>
+            </a:r>
+            <a:r>
+              <a:rPr lang="en-US" dirty="0">
+                <a:solidFill>
+                  <a:srgbClr val="0070C0"/>
+                </a:solidFill>
+              </a:rPr>
+              <a:t> </a:t>
+            </a:r>
+            <a:r>
+              <a:rPr lang="en-US" dirty="0" err="1">
+                <a:solidFill>
+                  <a:srgbClr val="0070C0"/>
+                </a:solidFill>
+              </a:rPr>
+              <a:t>por</a:t>
+            </a:r>
+            <a:r>
+              <a:rPr lang="en-US" dirty="0">
+                <a:solidFill>
+                  <a:srgbClr val="0070C0"/>
+                </a:solidFill>
+              </a:rPr>
+              <a:t> el </a:t>
+            </a:r>
+            <a:r>
+              <a:rPr lang="en-US" dirty="0" err="1">
+                <a:solidFill>
+                  <a:srgbClr val="0070C0"/>
+                </a:solidFill>
+              </a:rPr>
+              <a:t>lenguaje</a:t>
+            </a:r>
+            <a:r>
+              <a:rPr lang="en-US" dirty="0">
+                <a:solidFill>
+                  <a:srgbClr val="0070C0"/>
+                </a:solidFill>
+              </a:rPr>
+              <a:t> no </a:t>
+            </a:r>
+            <a:r>
+              <a:rPr lang="en-US" dirty="0" err="1">
+                <a:solidFill>
+                  <a:srgbClr val="0070C0"/>
+                </a:solidFill>
+              </a:rPr>
+              <a:t>admiten</a:t>
+            </a:r>
+            <a:r>
+              <a:rPr lang="en-US" dirty="0">
+                <a:solidFill>
+                  <a:srgbClr val="0070C0"/>
+                </a:solidFill>
+              </a:rPr>
+              <a:t> </a:t>
+            </a:r>
+            <a:r>
+              <a:rPr lang="en-US" dirty="0" err="1">
+                <a:solidFill>
+                  <a:srgbClr val="0070C0"/>
+                </a:solidFill>
+              </a:rPr>
+              <a:t>valores</a:t>
+            </a:r>
+            <a:r>
+              <a:rPr lang="en-US" dirty="0">
+                <a:solidFill>
+                  <a:srgbClr val="0070C0"/>
+                </a:solidFill>
+              </a:rPr>
+              <a:t> </a:t>
+            </a:r>
+            <a:r>
+              <a:rPr lang="en-US" dirty="0" err="1">
+                <a:solidFill>
+                  <a:srgbClr val="0070C0"/>
+                </a:solidFill>
+              </a:rPr>
+              <a:t>nulos</a:t>
+            </a:r>
+            <a:r>
+              <a:rPr lang="en-US" dirty="0">
+                <a:solidFill>
+                  <a:srgbClr val="0070C0"/>
+                </a:solidFill>
+              </a:rPr>
+              <a:t>, </a:t>
+            </a:r>
+            <a:r>
+              <a:rPr lang="en-US" dirty="0" err="1">
+                <a:solidFill>
+                  <a:srgbClr val="0070C0"/>
+                </a:solidFill>
+              </a:rPr>
+              <a:t>pero</a:t>
+            </a:r>
+            <a:r>
+              <a:rPr lang="en-US" dirty="0">
+                <a:solidFill>
+                  <a:srgbClr val="0070C0"/>
+                </a:solidFill>
+              </a:rPr>
+              <a:t> </a:t>
+            </a:r>
+            <a:r>
+              <a:rPr lang="en-US" dirty="0" err="1">
+                <a:solidFill>
+                  <a:srgbClr val="0070C0"/>
+                </a:solidFill>
+              </a:rPr>
+              <a:t>por</a:t>
+            </a:r>
+            <a:r>
+              <a:rPr lang="en-US" dirty="0">
+                <a:solidFill>
+                  <a:srgbClr val="0070C0"/>
+                </a:solidFill>
+              </a:rPr>
+              <a:t> el </a:t>
+            </a:r>
+            <a:r>
+              <a:rPr lang="en-US" dirty="0" err="1">
+                <a:solidFill>
+                  <a:srgbClr val="0070C0"/>
+                </a:solidFill>
+              </a:rPr>
+              <a:t>contexto</a:t>
+            </a:r>
+            <a:r>
+              <a:rPr lang="en-US" dirty="0">
+                <a:solidFill>
+                  <a:srgbClr val="0070C0"/>
+                </a:solidFill>
+              </a:rPr>
+              <a:t> </a:t>
+            </a:r>
+            <a:r>
+              <a:rPr lang="en-US" dirty="0" err="1">
+                <a:solidFill>
+                  <a:srgbClr val="0070C0"/>
+                </a:solidFill>
+              </a:rPr>
+              <a:t>necesitamos</a:t>
+            </a:r>
+            <a:r>
+              <a:rPr lang="en-US" dirty="0">
+                <a:solidFill>
+                  <a:srgbClr val="0070C0"/>
+                </a:solidFill>
+              </a:rPr>
+              <a:t> </a:t>
+            </a:r>
+            <a:r>
+              <a:rPr lang="en-US" dirty="0" err="1">
+                <a:solidFill>
+                  <a:srgbClr val="0070C0"/>
+                </a:solidFill>
+              </a:rPr>
+              <a:t>modelar</a:t>
+            </a:r>
+            <a:r>
+              <a:rPr lang="en-US" dirty="0">
+                <a:solidFill>
+                  <a:srgbClr val="0070C0"/>
+                </a:solidFill>
+              </a:rPr>
+              <a:t> </a:t>
+            </a:r>
+            <a:r>
+              <a:rPr lang="en-US" dirty="0" err="1">
+                <a:solidFill>
+                  <a:srgbClr val="0070C0"/>
+                </a:solidFill>
+              </a:rPr>
+              <a:t>casos</a:t>
+            </a:r>
+            <a:r>
+              <a:rPr lang="en-US" dirty="0">
+                <a:solidFill>
+                  <a:srgbClr val="0070C0"/>
+                </a:solidFill>
+              </a:rPr>
+              <a:t> de ”</a:t>
+            </a:r>
+            <a:r>
+              <a:rPr lang="en-US" dirty="0" err="1">
+                <a:solidFill>
+                  <a:srgbClr val="0070C0"/>
+                </a:solidFill>
+              </a:rPr>
+              <a:t>ausencia</a:t>
+            </a:r>
+            <a:r>
+              <a:rPr lang="en-US" dirty="0">
+                <a:solidFill>
+                  <a:srgbClr val="0070C0"/>
+                </a:solidFill>
+              </a:rPr>
+              <a:t> de </a:t>
+            </a:r>
+            <a:r>
+              <a:rPr lang="en-US" dirty="0" err="1">
+                <a:solidFill>
+                  <a:srgbClr val="0070C0"/>
+                </a:solidFill>
+              </a:rPr>
+              <a:t>información</a:t>
+            </a:r>
+            <a:r>
+              <a:rPr lang="en-US" dirty="0">
+                <a:solidFill>
+                  <a:srgbClr val="0070C0"/>
+                </a:solidFill>
+              </a:rPr>
+              <a:t>”</a:t>
+            </a:r>
+          </a:p>
+          <a:p>
+            <a:endParaRPr lang="en-US" dirty="0">
+              <a:solidFill>
+                <a:srgbClr val="0070C0"/>
+              </a:solidFill>
+            </a:endParaRPr>
+          </a:p>
+          <a:p>
+            <a:r>
+              <a:rPr lang="en-US" dirty="0">
+                <a:solidFill>
+                  <a:srgbClr val="0070C0"/>
+                </a:solidFill>
+              </a:rPr>
+              <a:t>Un </a:t>
+            </a:r>
+            <a:r>
+              <a:rPr lang="en-US" dirty="0" err="1">
+                <a:solidFill>
+                  <a:srgbClr val="0070C0"/>
+                </a:solidFill>
+              </a:rPr>
+              <a:t>ejemplo</a:t>
+            </a:r>
+            <a:r>
+              <a:rPr lang="en-US" dirty="0">
+                <a:solidFill>
+                  <a:srgbClr val="0070C0"/>
+                </a:solidFill>
+              </a:rPr>
+              <a:t> </a:t>
+            </a:r>
+            <a:r>
+              <a:rPr lang="en-US" dirty="0" err="1">
+                <a:solidFill>
+                  <a:srgbClr val="0070C0"/>
+                </a:solidFill>
+              </a:rPr>
+              <a:t>es</a:t>
+            </a:r>
+            <a:r>
+              <a:rPr lang="en-US" dirty="0">
+                <a:solidFill>
+                  <a:srgbClr val="0070C0"/>
+                </a:solidFill>
+              </a:rPr>
+              <a:t> </a:t>
+            </a:r>
+            <a:r>
+              <a:rPr lang="en-US" dirty="0" err="1">
+                <a:solidFill>
+                  <a:srgbClr val="0070C0"/>
+                </a:solidFill>
+              </a:rPr>
+              <a:t>cuando</a:t>
+            </a:r>
+            <a:r>
+              <a:rPr lang="en-US" dirty="0">
+                <a:solidFill>
+                  <a:srgbClr val="0070C0"/>
+                </a:solidFill>
+              </a:rPr>
+              <a:t> se </a:t>
+            </a:r>
+            <a:r>
+              <a:rPr lang="en-US" dirty="0" err="1">
+                <a:solidFill>
+                  <a:srgbClr val="0070C0"/>
+                </a:solidFill>
+              </a:rPr>
+              <a:t>mapea</a:t>
+            </a:r>
+            <a:r>
+              <a:rPr lang="en-US" dirty="0">
+                <a:solidFill>
+                  <a:srgbClr val="0070C0"/>
+                </a:solidFill>
+              </a:rPr>
+              <a:t> a </a:t>
+            </a:r>
+            <a:r>
+              <a:rPr lang="en-US" dirty="0" err="1">
+                <a:solidFill>
+                  <a:srgbClr val="FF0000"/>
+                </a:solidFill>
+              </a:rPr>
+              <a:t>campos</a:t>
+            </a:r>
+            <a:r>
+              <a:rPr lang="en-US" dirty="0">
+                <a:solidFill>
+                  <a:srgbClr val="FF0000"/>
+                </a:solidFill>
+              </a:rPr>
+              <a:t> </a:t>
+            </a:r>
+            <a:r>
+              <a:rPr lang="en-US" dirty="0" err="1">
+                <a:solidFill>
+                  <a:srgbClr val="FF0000"/>
+                </a:solidFill>
+              </a:rPr>
+              <a:t>numéricos</a:t>
+            </a:r>
+            <a:r>
+              <a:rPr lang="en-US" dirty="0">
+                <a:solidFill>
+                  <a:srgbClr val="FF0000"/>
+                </a:solidFill>
+              </a:rPr>
+              <a:t> </a:t>
+            </a:r>
+            <a:r>
+              <a:rPr lang="en-US" dirty="0" err="1">
+                <a:solidFill>
+                  <a:srgbClr val="FF0000"/>
+                </a:solidFill>
+              </a:rPr>
+              <a:t>en</a:t>
+            </a:r>
+            <a:r>
+              <a:rPr lang="en-US" dirty="0">
+                <a:solidFill>
+                  <a:srgbClr val="FF0000"/>
+                </a:solidFill>
+              </a:rPr>
+              <a:t> bases de </a:t>
+            </a:r>
+            <a:r>
+              <a:rPr lang="en-US" dirty="0" err="1">
+                <a:solidFill>
+                  <a:srgbClr val="FF0000"/>
+                </a:solidFill>
+              </a:rPr>
+              <a:t>datos</a:t>
+            </a:r>
+            <a:r>
+              <a:rPr lang="en-US" dirty="0">
+                <a:solidFill>
+                  <a:srgbClr val="FF0000"/>
+                </a:solidFill>
+              </a:rPr>
+              <a:t> SQL</a:t>
+            </a:r>
+            <a:r>
+              <a:rPr lang="en-US" dirty="0">
+                <a:solidFill>
+                  <a:srgbClr val="0070C0"/>
+                </a:solidFill>
+              </a:rPr>
+              <a:t> </a:t>
+            </a:r>
+            <a:r>
+              <a:rPr lang="en-US" dirty="0" err="1">
+                <a:solidFill>
+                  <a:srgbClr val="0070C0"/>
+                </a:solidFill>
+              </a:rPr>
+              <a:t>donde</a:t>
+            </a:r>
+            <a:r>
+              <a:rPr lang="en-US" dirty="0">
+                <a:solidFill>
+                  <a:srgbClr val="0070C0"/>
+                </a:solidFill>
+              </a:rPr>
+              <a:t> </a:t>
+            </a:r>
+            <a:r>
+              <a:rPr lang="en-US" dirty="0" err="1">
+                <a:solidFill>
+                  <a:srgbClr val="0070C0"/>
+                </a:solidFill>
+              </a:rPr>
+              <a:t>los</a:t>
+            </a:r>
+            <a:r>
+              <a:rPr lang="en-US" dirty="0">
+                <a:solidFill>
+                  <a:srgbClr val="0070C0"/>
+                </a:solidFill>
+              </a:rPr>
+              <a:t> </a:t>
+            </a:r>
+            <a:r>
+              <a:rPr lang="en-US" dirty="0" err="1">
+                <a:solidFill>
+                  <a:srgbClr val="0070C0"/>
+                </a:solidFill>
+              </a:rPr>
+              <a:t>valores</a:t>
+            </a:r>
+            <a:r>
+              <a:rPr lang="en-US" dirty="0">
+                <a:solidFill>
+                  <a:srgbClr val="0070C0"/>
+                </a:solidFill>
+              </a:rPr>
+              <a:t> </a:t>
+            </a:r>
+            <a:r>
+              <a:rPr lang="en-US" dirty="0" err="1">
+                <a:solidFill>
+                  <a:srgbClr val="0070C0"/>
+                </a:solidFill>
+              </a:rPr>
+              <a:t>pueden</a:t>
+            </a:r>
+            <a:r>
+              <a:rPr lang="en-US" dirty="0">
+                <a:solidFill>
+                  <a:srgbClr val="0070C0"/>
+                </a:solidFill>
+              </a:rPr>
+              <a:t> </a:t>
+            </a:r>
+            <a:r>
+              <a:rPr lang="en-US" dirty="0" err="1">
+                <a:solidFill>
+                  <a:srgbClr val="0070C0"/>
+                </a:solidFill>
+              </a:rPr>
+              <a:t>ser</a:t>
+            </a:r>
+            <a:r>
+              <a:rPr lang="en-US" dirty="0">
+                <a:solidFill>
+                  <a:srgbClr val="0070C0"/>
+                </a:solidFill>
+              </a:rPr>
+              <a:t> </a:t>
+            </a:r>
+            <a:r>
+              <a:rPr lang="en-US" dirty="0" err="1">
+                <a:solidFill>
+                  <a:srgbClr val="0070C0"/>
+                </a:solidFill>
+              </a:rPr>
+              <a:t>nulos</a:t>
+            </a:r>
+            <a:r>
+              <a:rPr lang="en-US" dirty="0">
+                <a:solidFill>
+                  <a:srgbClr val="0070C0"/>
+                </a:solidFill>
+              </a:rPr>
+              <a:t>.</a:t>
+            </a:r>
+          </a:p>
+          <a:p>
+            <a:endParaRPr lang="en-US" dirty="0">
+              <a:solidFill>
+                <a:srgbClr val="0070C0"/>
+              </a:solidFill>
+            </a:endParaRPr>
+          </a:p>
+          <a:p>
+            <a:r>
+              <a:rPr lang="en-US" dirty="0" err="1">
+                <a:solidFill>
+                  <a:srgbClr val="0070C0"/>
+                </a:solidFill>
+              </a:rPr>
+              <a:t>Otro</a:t>
+            </a:r>
+            <a:r>
+              <a:rPr lang="en-US" dirty="0">
+                <a:solidFill>
+                  <a:srgbClr val="0070C0"/>
+                </a:solidFill>
+              </a:rPr>
+              <a:t> </a:t>
+            </a:r>
+            <a:r>
+              <a:rPr lang="en-US" dirty="0" err="1">
+                <a:solidFill>
+                  <a:srgbClr val="0070C0"/>
+                </a:solidFill>
+              </a:rPr>
+              <a:t>caso</a:t>
+            </a:r>
+            <a:r>
+              <a:rPr lang="en-US" dirty="0">
+                <a:solidFill>
+                  <a:srgbClr val="0070C0"/>
+                </a:solidFill>
+              </a:rPr>
+              <a:t> </a:t>
+            </a:r>
+            <a:r>
+              <a:rPr lang="en-US" dirty="0" err="1">
+                <a:solidFill>
+                  <a:srgbClr val="0070C0"/>
+                </a:solidFill>
+              </a:rPr>
+              <a:t>común</a:t>
+            </a:r>
+            <a:r>
+              <a:rPr lang="en-US" dirty="0">
+                <a:solidFill>
+                  <a:srgbClr val="0070C0"/>
+                </a:solidFill>
+              </a:rPr>
+              <a:t> </a:t>
+            </a:r>
+            <a:r>
+              <a:rPr lang="en-US" dirty="0" err="1">
+                <a:solidFill>
+                  <a:srgbClr val="0070C0"/>
+                </a:solidFill>
+              </a:rPr>
+              <a:t>es</a:t>
+            </a:r>
+            <a:r>
+              <a:rPr lang="en-US" dirty="0">
+                <a:solidFill>
+                  <a:srgbClr val="0070C0"/>
+                </a:solidFill>
+              </a:rPr>
+              <a:t> </a:t>
+            </a:r>
+            <a:r>
+              <a:rPr lang="en-US" dirty="0" err="1">
+                <a:solidFill>
+                  <a:srgbClr val="0070C0"/>
+                </a:solidFill>
+              </a:rPr>
+              <a:t>en</a:t>
+            </a:r>
+            <a:r>
+              <a:rPr lang="en-US" dirty="0">
+                <a:solidFill>
+                  <a:srgbClr val="0070C0"/>
+                </a:solidFill>
+              </a:rPr>
+              <a:t> el ORM </a:t>
+            </a:r>
+            <a:r>
+              <a:rPr lang="en-US" dirty="0">
+                <a:solidFill>
+                  <a:srgbClr val="FF0000"/>
+                </a:solidFill>
+              </a:rPr>
+              <a:t>Entity Framework</a:t>
+            </a:r>
+            <a:r>
+              <a:rPr lang="en-US" dirty="0">
+                <a:solidFill>
+                  <a:srgbClr val="0070C0"/>
+                </a:solidFill>
+              </a:rPr>
+              <a:t>, al </a:t>
+            </a:r>
+            <a:r>
+              <a:rPr lang="en-US" dirty="0" err="1">
+                <a:solidFill>
+                  <a:srgbClr val="0070C0"/>
+                </a:solidFill>
+              </a:rPr>
+              <a:t>modelar</a:t>
+            </a:r>
+            <a:r>
+              <a:rPr lang="en-US" dirty="0">
+                <a:solidFill>
+                  <a:srgbClr val="0070C0"/>
+                </a:solidFill>
+              </a:rPr>
+              <a:t> </a:t>
+            </a:r>
+            <a:r>
+              <a:rPr lang="en-US" dirty="0" err="1">
+                <a:solidFill>
+                  <a:srgbClr val="0070C0"/>
+                </a:solidFill>
+              </a:rPr>
+              <a:t>campos</a:t>
+            </a:r>
+            <a:r>
+              <a:rPr lang="en-US" dirty="0">
+                <a:solidFill>
+                  <a:srgbClr val="0070C0"/>
+                </a:solidFill>
+              </a:rPr>
+              <a:t> </a:t>
+            </a:r>
+            <a:r>
+              <a:rPr lang="en-US" dirty="0" err="1">
+                <a:solidFill>
+                  <a:srgbClr val="0070C0"/>
+                </a:solidFill>
+              </a:rPr>
+              <a:t>numéricos</a:t>
+            </a:r>
+            <a:r>
+              <a:rPr lang="en-US" dirty="0">
+                <a:solidFill>
+                  <a:srgbClr val="0070C0"/>
+                </a:solidFill>
+              </a:rPr>
+              <a:t>, de </a:t>
+            </a:r>
+            <a:r>
+              <a:rPr lang="en-US" dirty="0" err="1">
+                <a:solidFill>
+                  <a:srgbClr val="0070C0"/>
+                </a:solidFill>
+              </a:rPr>
+              <a:t>fechas</a:t>
+            </a:r>
+            <a:r>
+              <a:rPr lang="en-US" dirty="0">
+                <a:solidFill>
+                  <a:srgbClr val="0070C0"/>
+                </a:solidFill>
+              </a:rPr>
+              <a:t> o </a:t>
+            </a:r>
+            <a:r>
+              <a:rPr lang="en-US" dirty="0" err="1">
+                <a:solidFill>
+                  <a:srgbClr val="0070C0"/>
+                </a:solidFill>
+              </a:rPr>
+              <a:t>booleanos</a:t>
+            </a:r>
+            <a:r>
+              <a:rPr lang="en-US" dirty="0">
+                <a:solidFill>
+                  <a:srgbClr val="0070C0"/>
+                </a:solidFill>
+              </a:rPr>
+              <a:t>, al </a:t>
+            </a:r>
+            <a:r>
+              <a:rPr lang="en-US" dirty="0" err="1">
+                <a:solidFill>
+                  <a:srgbClr val="0070C0"/>
+                </a:solidFill>
+              </a:rPr>
+              <a:t>definirlos</a:t>
+            </a:r>
+            <a:r>
+              <a:rPr lang="en-US" dirty="0">
+                <a:solidFill>
+                  <a:srgbClr val="0070C0"/>
+                </a:solidFill>
+              </a:rPr>
+              <a:t> </a:t>
+            </a:r>
+            <a:r>
+              <a:rPr lang="en-US" dirty="0" err="1">
+                <a:solidFill>
+                  <a:srgbClr val="0070C0"/>
+                </a:solidFill>
+              </a:rPr>
+              <a:t>como</a:t>
+            </a:r>
+            <a:r>
+              <a:rPr lang="en-US" dirty="0">
+                <a:solidFill>
+                  <a:srgbClr val="0070C0"/>
+                </a:solidFill>
+              </a:rPr>
+              <a:t> </a:t>
+            </a:r>
+            <a:r>
+              <a:rPr lang="en-US" dirty="0" err="1">
+                <a:solidFill>
+                  <a:srgbClr val="0070C0"/>
+                </a:solidFill>
+              </a:rPr>
+              <a:t>int</a:t>
+            </a:r>
+            <a:r>
+              <a:rPr lang="en-US" dirty="0">
+                <a:solidFill>
+                  <a:srgbClr val="0070C0"/>
+                </a:solidFill>
+              </a:rPr>
+              <a:t>?, </a:t>
+            </a:r>
+            <a:r>
+              <a:rPr lang="en-US" dirty="0" err="1">
+                <a:solidFill>
+                  <a:srgbClr val="0070C0"/>
+                </a:solidFill>
+              </a:rPr>
+              <a:t>DateTime</a:t>
+            </a:r>
+            <a:r>
+              <a:rPr lang="en-US" dirty="0">
+                <a:solidFill>
+                  <a:srgbClr val="0070C0"/>
+                </a:solidFill>
+              </a:rPr>
+              <a:t>? </a:t>
+            </a:r>
+            <a:r>
+              <a:rPr lang="en-US" dirty="0" err="1">
+                <a:solidFill>
+                  <a:srgbClr val="0070C0"/>
+                </a:solidFill>
+              </a:rPr>
+              <a:t>ó</a:t>
+            </a:r>
+            <a:r>
+              <a:rPr lang="en-US" dirty="0">
+                <a:solidFill>
+                  <a:srgbClr val="0070C0"/>
+                </a:solidFill>
+              </a:rPr>
+              <a:t> bool?, </a:t>
+            </a:r>
+            <a:r>
+              <a:rPr lang="en-US" dirty="0" err="1">
+                <a:solidFill>
+                  <a:srgbClr val="0070C0"/>
+                </a:solidFill>
+              </a:rPr>
+              <a:t>estamos</a:t>
+            </a:r>
+            <a:r>
+              <a:rPr lang="en-US" dirty="0">
+                <a:solidFill>
+                  <a:srgbClr val="0070C0"/>
+                </a:solidFill>
+              </a:rPr>
+              <a:t> </a:t>
+            </a:r>
+            <a:r>
+              <a:rPr lang="en-US" dirty="0" err="1">
+                <a:solidFill>
+                  <a:srgbClr val="0070C0"/>
+                </a:solidFill>
+              </a:rPr>
+              <a:t>modelando</a:t>
+            </a:r>
+            <a:r>
+              <a:rPr lang="en-US" dirty="0">
+                <a:solidFill>
+                  <a:srgbClr val="0070C0"/>
+                </a:solidFill>
+              </a:rPr>
+              <a:t> </a:t>
+            </a:r>
+            <a:r>
+              <a:rPr lang="en-US" dirty="0" err="1">
+                <a:solidFill>
+                  <a:srgbClr val="0070C0"/>
+                </a:solidFill>
+              </a:rPr>
+              <a:t>valores</a:t>
+            </a:r>
+            <a:r>
+              <a:rPr lang="en-US" dirty="0">
+                <a:solidFill>
+                  <a:srgbClr val="0070C0"/>
+                </a:solidFill>
+              </a:rPr>
+              <a:t> </a:t>
+            </a:r>
+            <a:r>
+              <a:rPr lang="en-US" dirty="0" err="1">
+                <a:solidFill>
+                  <a:srgbClr val="0070C0"/>
+                </a:solidFill>
+              </a:rPr>
+              <a:t>nullables</a:t>
+            </a:r>
+            <a:r>
+              <a:rPr lang="en-US" dirty="0">
+                <a:solidFill>
+                  <a:srgbClr val="0070C0"/>
+                </a:solidFill>
+              </a:rPr>
+              <a:t> </a:t>
+            </a:r>
+            <a:r>
+              <a:rPr lang="en-US" dirty="0" err="1">
+                <a:solidFill>
+                  <a:srgbClr val="0070C0"/>
+                </a:solidFill>
+              </a:rPr>
+              <a:t>en</a:t>
+            </a:r>
+            <a:r>
+              <a:rPr lang="en-US" dirty="0">
+                <a:solidFill>
+                  <a:srgbClr val="0070C0"/>
+                </a:solidFill>
+              </a:rPr>
+              <a:t> la base de </a:t>
+            </a:r>
+            <a:r>
+              <a:rPr lang="en-US" dirty="0" err="1">
+                <a:solidFill>
+                  <a:srgbClr val="0070C0"/>
+                </a:solidFill>
+              </a:rPr>
+              <a:t>datos</a:t>
+            </a:r>
+            <a:r>
+              <a:rPr lang="en-US" dirty="0">
+                <a:solidFill>
+                  <a:srgbClr val="0070C0"/>
+                </a:solidFill>
+              </a:rPr>
+              <a:t>.   </a:t>
+            </a:r>
+          </a:p>
+        </p:txBody>
+      </p:sp>
+    </p:spTree>
+    <p:extLst>
+      <p:ext uri="{BB962C8B-B14F-4D97-AF65-F5344CB8AC3E}">
+        <p14:creationId xmlns:p14="http://schemas.microsoft.com/office/powerpoint/2010/main" val="1254834773"/>
       </p:ext>
     </p:extLst>
   </p:cSld>

</xml_diff>

<commit_message>
Conversion a y de Nullable
</commit_message>
<xml_diff>
--- a/Docs/Nullable.pptx
+++ b/Docs/Nullable.pptx
@@ -5,7 +5,7 @@
     <p:sldMasterId id="2147483648" r:id="rId1"/>
   </p:sldMasterIdLst>
   <p:notesMasterIdLst>
-    <p:notesMasterId r:id="rId9"/>
+    <p:notesMasterId r:id="rId11"/>
   </p:notesMasterIdLst>
   <p:sldIdLst>
     <p:sldId id="256" r:id="rId2"/>
@@ -15,6 +15,8 @@
     <p:sldId id="260" r:id="rId6"/>
     <p:sldId id="261" r:id="rId7"/>
     <p:sldId id="262" r:id="rId8"/>
+    <p:sldId id="263" r:id="rId9"/>
+    <p:sldId id="264" r:id="rId10"/>
   </p:sldIdLst>
   <p:sldSz cx="12192000" cy="6858000"/>
   <p:notesSz cx="6858000" cy="9144000"/>
@@ -203,7 +205,7 @@
           <a:p>
             <a:fld id="{3C17E8D4-202C-384A-952C-ED5C2B149F8E}" type="datetimeFigureOut">
               <a:rPr lang="en-US" smtClean="0"/>
-              <a:t>5/6/19</a:t>
+              <a:t>5/7/19</a:t>
             </a:fld>
             <a:endParaRPr lang="en-US"/>
           </a:p>
@@ -869,7 +871,7 @@
           <a:p>
             <a:fld id="{50065586-3F98-CC44-BCFC-F575C7686E1C}" type="datetimeFigureOut">
               <a:rPr lang="en-US" smtClean="0"/>
-              <a:t>5/6/19</a:t>
+              <a:t>5/7/19</a:t>
             </a:fld>
             <a:endParaRPr lang="en-US"/>
           </a:p>
@@ -1067,7 +1069,7 @@
           <a:p>
             <a:fld id="{50065586-3F98-CC44-BCFC-F575C7686E1C}" type="datetimeFigureOut">
               <a:rPr lang="en-US" smtClean="0"/>
-              <a:t>5/6/19</a:t>
+              <a:t>5/7/19</a:t>
             </a:fld>
             <a:endParaRPr lang="en-US"/>
           </a:p>
@@ -1275,7 +1277,7 @@
           <a:p>
             <a:fld id="{50065586-3F98-CC44-BCFC-F575C7686E1C}" type="datetimeFigureOut">
               <a:rPr lang="en-US" smtClean="0"/>
-              <a:t>5/6/19</a:t>
+              <a:t>5/7/19</a:t>
             </a:fld>
             <a:endParaRPr lang="en-US"/>
           </a:p>
@@ -1473,7 +1475,7 @@
           <a:p>
             <a:fld id="{50065586-3F98-CC44-BCFC-F575C7686E1C}" type="datetimeFigureOut">
               <a:rPr lang="en-US" smtClean="0"/>
-              <a:t>5/6/19</a:t>
+              <a:t>5/7/19</a:t>
             </a:fld>
             <a:endParaRPr lang="en-US"/>
           </a:p>
@@ -1748,7 +1750,7 @@
           <a:p>
             <a:fld id="{50065586-3F98-CC44-BCFC-F575C7686E1C}" type="datetimeFigureOut">
               <a:rPr lang="en-US" smtClean="0"/>
-              <a:t>5/6/19</a:t>
+              <a:t>5/7/19</a:t>
             </a:fld>
             <a:endParaRPr lang="en-US"/>
           </a:p>
@@ -2013,7 +2015,7 @@
           <a:p>
             <a:fld id="{50065586-3F98-CC44-BCFC-F575C7686E1C}" type="datetimeFigureOut">
               <a:rPr lang="en-US" smtClean="0"/>
-              <a:t>5/6/19</a:t>
+              <a:t>5/7/19</a:t>
             </a:fld>
             <a:endParaRPr lang="en-US"/>
           </a:p>
@@ -2425,7 +2427,7 @@
           <a:p>
             <a:fld id="{50065586-3F98-CC44-BCFC-F575C7686E1C}" type="datetimeFigureOut">
               <a:rPr lang="en-US" smtClean="0"/>
-              <a:t>5/6/19</a:t>
+              <a:t>5/7/19</a:t>
             </a:fld>
             <a:endParaRPr lang="en-US"/>
           </a:p>
@@ -2566,7 +2568,7 @@
           <a:p>
             <a:fld id="{50065586-3F98-CC44-BCFC-F575C7686E1C}" type="datetimeFigureOut">
               <a:rPr lang="en-US" smtClean="0"/>
-              <a:t>5/6/19</a:t>
+              <a:t>5/7/19</a:t>
             </a:fld>
             <a:endParaRPr lang="en-US"/>
           </a:p>
@@ -2679,7 +2681,7 @@
           <a:p>
             <a:fld id="{50065586-3F98-CC44-BCFC-F575C7686E1C}" type="datetimeFigureOut">
               <a:rPr lang="en-US" smtClean="0"/>
-              <a:t>5/6/19</a:t>
+              <a:t>5/7/19</a:t>
             </a:fld>
             <a:endParaRPr lang="en-US"/>
           </a:p>
@@ -2990,7 +2992,7 @@
           <a:p>
             <a:fld id="{50065586-3F98-CC44-BCFC-F575C7686E1C}" type="datetimeFigureOut">
               <a:rPr lang="en-US" smtClean="0"/>
-              <a:t>5/6/19</a:t>
+              <a:t>5/7/19</a:t>
             </a:fld>
             <a:endParaRPr lang="en-US"/>
           </a:p>
@@ -3278,7 +3280,7 @@
           <a:p>
             <a:fld id="{50065586-3F98-CC44-BCFC-F575C7686E1C}" type="datetimeFigureOut">
               <a:rPr lang="en-US" smtClean="0"/>
-              <a:t>5/6/19</a:t>
+              <a:t>5/7/19</a:t>
             </a:fld>
             <a:endParaRPr lang="en-US"/>
           </a:p>
@@ -3519,7 +3521,7 @@
           <a:p>
             <a:fld id="{50065586-3F98-CC44-BCFC-F575C7686E1C}" type="datetimeFigureOut">
               <a:rPr lang="en-US" smtClean="0"/>
-              <a:t>5/6/19</a:t>
+              <a:t>5/7/19</a:t>
             </a:fld>
             <a:endParaRPr lang="en-US"/>
           </a:p>
@@ -7260,16 +7262,6 @@
               </a:rPr>
               <a:t>nulos</a:t>
             </a:r>
-            <a:r>
-              <a:rPr lang="en-US" dirty="0">
-                <a:solidFill>
-                  <a:srgbClr val="0070C0"/>
-                </a:solidFill>
-              </a:rPr>
-              <a:t>.</a:t>
-            </a:r>
-          </a:p>
-          <a:p>
             <a:endParaRPr lang="en-US" dirty="0">
               <a:solidFill>
                 <a:srgbClr val="0070C0"/>
@@ -7277,6 +7269,13 @@
             </a:endParaRPr>
           </a:p>
           <a:p>
+            <a:endParaRPr lang="en-US" dirty="0">
+              <a:solidFill>
+                <a:srgbClr val="0070C0"/>
+              </a:solidFill>
+            </a:endParaRPr>
+          </a:p>
+          <a:p>
             <a:r>
               <a:rPr lang="en-US" dirty="0" err="1">
                 <a:solidFill>
@@ -7627,7 +7626,7 @@
                   <a:srgbClr val="0070C0"/>
                 </a:solidFill>
               </a:rPr>
-              <a:t>.   </a:t>
+              <a:t>   </a:t>
             </a:r>
           </a:p>
         </p:txBody>
@@ -7636,6 +7635,698 @@
     <p:extLst>
       <p:ext uri="{BB962C8B-B14F-4D97-AF65-F5344CB8AC3E}">
         <p14:creationId xmlns:p14="http://schemas.microsoft.com/office/powerpoint/2010/main" val="1254834773"/>
+      </p:ext>
+    </p:extLst>
+  </p:cSld>
+  <p:clrMapOvr>
+    <a:masterClrMapping/>
+  </p:clrMapOvr>
+</p:sld>
+</file>
+
+<file path=ppt/slides/slide8.xml><?xml version="1.0" encoding="utf-8"?>
+<p:sld xmlns:a="http://schemas.openxmlformats.org/drawingml/2006/main" xmlns:r="http://schemas.openxmlformats.org/officeDocument/2006/relationships" xmlns:p="http://schemas.openxmlformats.org/presentationml/2006/main">
+  <p:cSld>
+    <p:spTree>
+      <p:nvGrpSpPr>
+        <p:cNvPr id="1" name=""/>
+        <p:cNvGrpSpPr/>
+        <p:nvPr/>
+      </p:nvGrpSpPr>
+      <p:grpSpPr>
+        <a:xfrm>
+          <a:off x="0" y="0"/>
+          <a:ext cx="0" cy="0"/>
+          <a:chOff x="0" y="0"/>
+          <a:chExt cx="0" cy="0"/>
+        </a:xfrm>
+      </p:grpSpPr>
+      <p:sp>
+        <p:nvSpPr>
+          <p:cNvPr id="2" name="Title 1">
+            <a:extLst>
+              <a:ext uri="{FF2B5EF4-FFF2-40B4-BE49-F238E27FC236}">
+                <a16:creationId xmlns:a16="http://schemas.microsoft.com/office/drawing/2014/main" id="{630D9355-5E09-A749-BAC3-BA1447512C67}"/>
+              </a:ext>
+            </a:extLst>
+          </p:cNvPr>
+          <p:cNvSpPr>
+            <a:spLocks noGrp="1"/>
+          </p:cNvSpPr>
+          <p:nvPr>
+            <p:ph type="title"/>
+          </p:nvPr>
+        </p:nvSpPr>
+        <p:spPr/>
+        <p:txBody>
+          <a:bodyPr/>
+          <a:lstStyle/>
+          <a:p>
+            <a:r>
+              <a:rPr lang="en-US" dirty="0"/>
+              <a:t>Lifted </a:t>
+            </a:r>
+            <a:r>
+              <a:rPr lang="en-US" dirty="0" err="1"/>
+              <a:t>operadores</a:t>
+            </a:r>
+            <a:endParaRPr lang="en-US" dirty="0"/>
+          </a:p>
+        </p:txBody>
+      </p:sp>
+      <p:grpSp>
+        <p:nvGrpSpPr>
+          <p:cNvPr id="10" name="Group 9">
+            <a:extLst>
+              <a:ext uri="{FF2B5EF4-FFF2-40B4-BE49-F238E27FC236}">
+                <a16:creationId xmlns:a16="http://schemas.microsoft.com/office/drawing/2014/main" id="{BFF12B90-ED1F-D542-9980-D67078F532D6}"/>
+              </a:ext>
+            </a:extLst>
+          </p:cNvPr>
+          <p:cNvGrpSpPr/>
+          <p:nvPr/>
+        </p:nvGrpSpPr>
+        <p:grpSpPr>
+          <a:xfrm>
+            <a:off x="1794923" y="1718831"/>
+            <a:ext cx="8602154" cy="4942317"/>
+            <a:chOff x="838200" y="1718831"/>
+            <a:chExt cx="8602154" cy="4942317"/>
+          </a:xfrm>
+        </p:grpSpPr>
+        <p:pic>
+          <p:nvPicPr>
+            <p:cNvPr id="5" name="Picture 4" descr="A screenshot of a cell phone&#10;&#10;Description automatically generated">
+              <a:extLst>
+                <a:ext uri="{FF2B5EF4-FFF2-40B4-BE49-F238E27FC236}">
+                  <a16:creationId xmlns:a16="http://schemas.microsoft.com/office/drawing/2014/main" id="{F0FABB02-8F22-B74A-B32C-052A66FCE277}"/>
+                </a:ext>
+              </a:extLst>
+            </p:cNvPr>
+            <p:cNvPicPr>
+              <a:picLocks noChangeAspect="1"/>
+            </p:cNvPicPr>
+            <p:nvPr/>
+          </p:nvPicPr>
+          <p:blipFill>
+            <a:blip r:embed="rId2"/>
+            <a:stretch>
+              <a:fillRect/>
+            </a:stretch>
+          </p:blipFill>
+          <p:spPr>
+            <a:xfrm>
+              <a:off x="3171305" y="2197370"/>
+              <a:ext cx="5849391" cy="4463778"/>
+            </a:xfrm>
+            <a:prstGeom prst="rect">
+              <a:avLst/>
+            </a:prstGeom>
+          </p:spPr>
+        </p:pic>
+        <p:sp>
+          <p:nvSpPr>
+            <p:cNvPr id="6" name="TextBox 5">
+              <a:extLst>
+                <a:ext uri="{FF2B5EF4-FFF2-40B4-BE49-F238E27FC236}">
+                  <a16:creationId xmlns:a16="http://schemas.microsoft.com/office/drawing/2014/main" id="{21CDE0A3-CFF4-4343-BBA0-480F1F3977A3}"/>
+                </a:ext>
+              </a:extLst>
+            </p:cNvPr>
+            <p:cNvSpPr txBox="1"/>
+            <p:nvPr/>
+          </p:nvSpPr>
+          <p:spPr>
+            <a:xfrm>
+              <a:off x="3290631" y="1718831"/>
+              <a:ext cx="1154243" cy="369332"/>
+            </a:xfrm>
+            <a:prstGeom prst="rect">
+              <a:avLst/>
+            </a:prstGeom>
+            <a:noFill/>
+          </p:spPr>
+          <p:txBody>
+            <a:bodyPr wrap="square" rtlCol="0">
+              <a:spAutoFit/>
+            </a:bodyPr>
+            <a:lstStyle/>
+            <a:p>
+              <a:r>
+                <a:rPr lang="en-US" dirty="0" err="1">
+                  <a:solidFill>
+                    <a:srgbClr val="FF0000"/>
+                  </a:solidFill>
+                </a:rPr>
+                <a:t>Expresión</a:t>
+              </a:r>
+              <a:endParaRPr lang="en-US" dirty="0">
+                <a:solidFill>
+                  <a:srgbClr val="FF0000"/>
+                </a:solidFill>
+              </a:endParaRPr>
+            </a:p>
+          </p:txBody>
+        </p:sp>
+        <p:sp>
+          <p:nvSpPr>
+            <p:cNvPr id="7" name="TextBox 6">
+              <a:extLst>
+                <a:ext uri="{FF2B5EF4-FFF2-40B4-BE49-F238E27FC236}">
+                  <a16:creationId xmlns:a16="http://schemas.microsoft.com/office/drawing/2014/main" id="{07524C2F-CC9F-2F47-8B9C-674B62DF0558}"/>
+                </a:ext>
+              </a:extLst>
+            </p:cNvPr>
+            <p:cNvSpPr txBox="1"/>
+            <p:nvPr/>
+          </p:nvSpPr>
+          <p:spPr>
+            <a:xfrm>
+              <a:off x="5564304" y="1718831"/>
+              <a:ext cx="2199641" cy="369332"/>
+            </a:xfrm>
+            <a:prstGeom prst="rect">
+              <a:avLst/>
+            </a:prstGeom>
+            <a:noFill/>
+          </p:spPr>
+          <p:txBody>
+            <a:bodyPr wrap="none" rtlCol="0">
+              <a:spAutoFit/>
+            </a:bodyPr>
+            <a:lstStyle/>
+            <a:p>
+              <a:r>
+                <a:rPr lang="en-US" dirty="0" err="1">
+                  <a:solidFill>
+                    <a:schemeClr val="accent1">
+                      <a:lumMod val="75000"/>
+                    </a:schemeClr>
+                  </a:solidFill>
+                </a:rPr>
+                <a:t>Operador</a:t>
+              </a:r>
+              <a:r>
+                <a:rPr lang="en-US" dirty="0">
+                  <a:solidFill>
+                    <a:schemeClr val="accent1">
+                      <a:lumMod val="75000"/>
+                    </a:schemeClr>
+                  </a:solidFill>
+                </a:rPr>
+                <a:t> overloaded</a:t>
+              </a:r>
+            </a:p>
+          </p:txBody>
+        </p:sp>
+        <p:sp>
+          <p:nvSpPr>
+            <p:cNvPr id="8" name="TextBox 7">
+              <a:extLst>
+                <a:ext uri="{FF2B5EF4-FFF2-40B4-BE49-F238E27FC236}">
+                  <a16:creationId xmlns:a16="http://schemas.microsoft.com/office/drawing/2014/main" id="{422B1F15-5CD8-194D-A6AF-2BA04815FDAA}"/>
+                </a:ext>
+              </a:extLst>
+            </p:cNvPr>
+            <p:cNvSpPr txBox="1"/>
+            <p:nvPr/>
+          </p:nvSpPr>
+          <p:spPr>
+            <a:xfrm>
+              <a:off x="8326395" y="1718831"/>
+              <a:ext cx="1113959" cy="369332"/>
+            </a:xfrm>
+            <a:prstGeom prst="rect">
+              <a:avLst/>
+            </a:prstGeom>
+            <a:noFill/>
+          </p:spPr>
+          <p:txBody>
+            <a:bodyPr wrap="none" rtlCol="0">
+              <a:spAutoFit/>
+            </a:bodyPr>
+            <a:lstStyle/>
+            <a:p>
+              <a:r>
+                <a:rPr lang="en-US" dirty="0" err="1">
+                  <a:solidFill>
+                    <a:srgbClr val="FF0000"/>
+                  </a:solidFill>
+                </a:rPr>
+                <a:t>Resultado</a:t>
+              </a:r>
+              <a:endParaRPr lang="en-US" dirty="0">
+                <a:solidFill>
+                  <a:srgbClr val="FF0000"/>
+                </a:solidFill>
+              </a:endParaRPr>
+            </a:p>
+          </p:txBody>
+        </p:sp>
+        <p:sp>
+          <p:nvSpPr>
+            <p:cNvPr id="9" name="TextBox 8">
+              <a:extLst>
+                <a:ext uri="{FF2B5EF4-FFF2-40B4-BE49-F238E27FC236}">
+                  <a16:creationId xmlns:a16="http://schemas.microsoft.com/office/drawing/2014/main" id="{F4044345-E1FD-F048-A8AD-426DF6726E1D}"/>
+                </a:ext>
+              </a:extLst>
+            </p:cNvPr>
+            <p:cNvSpPr txBox="1"/>
+            <p:nvPr/>
+          </p:nvSpPr>
+          <p:spPr>
+            <a:xfrm>
+              <a:off x="838200" y="1856509"/>
+              <a:ext cx="1836337" cy="923330"/>
+            </a:xfrm>
+            <a:prstGeom prst="rect">
+              <a:avLst/>
+            </a:prstGeom>
+            <a:noFill/>
+          </p:spPr>
+          <p:txBody>
+            <a:bodyPr wrap="none" rtlCol="0">
+              <a:spAutoFit/>
+            </a:bodyPr>
+            <a:lstStyle/>
+            <a:p>
+              <a:r>
+                <a:rPr lang="en-US" dirty="0" err="1">
+                  <a:solidFill>
+                    <a:schemeClr val="accent1">
+                      <a:lumMod val="75000"/>
+                    </a:schemeClr>
+                  </a:solidFill>
+                </a:rPr>
+                <a:t>int</a:t>
+              </a:r>
+              <a:r>
+                <a:rPr lang="en-US" dirty="0">
+                  <a:solidFill>
+                    <a:schemeClr val="accent1">
+                      <a:lumMod val="75000"/>
+                    </a:schemeClr>
+                  </a:solidFill>
+                </a:rPr>
+                <a:t>? </a:t>
+              </a:r>
+              <a:r>
+                <a:rPr lang="en-US" dirty="0" err="1">
+                  <a:solidFill>
+                    <a:schemeClr val="accent1">
+                      <a:lumMod val="75000"/>
+                    </a:schemeClr>
+                  </a:solidFill>
+                </a:rPr>
+                <a:t>nullInt</a:t>
+              </a:r>
+              <a:r>
+                <a:rPr lang="en-US" dirty="0">
+                  <a:solidFill>
+                    <a:schemeClr val="accent1">
+                      <a:lumMod val="75000"/>
+                    </a:schemeClr>
+                  </a:solidFill>
+                </a:rPr>
+                <a:t> = null;</a:t>
+              </a:r>
+            </a:p>
+            <a:p>
+              <a:r>
+                <a:rPr lang="en-US" dirty="0" err="1">
+                  <a:solidFill>
+                    <a:schemeClr val="accent1">
+                      <a:lumMod val="75000"/>
+                    </a:schemeClr>
+                  </a:solidFill>
+                </a:rPr>
+                <a:t>int</a:t>
+              </a:r>
+              <a:r>
+                <a:rPr lang="en-US" dirty="0">
+                  <a:solidFill>
+                    <a:schemeClr val="accent1">
+                      <a:lumMod val="75000"/>
+                    </a:schemeClr>
+                  </a:solidFill>
+                </a:rPr>
+                <a:t>? four = 4;</a:t>
+              </a:r>
+            </a:p>
+            <a:p>
+              <a:r>
+                <a:rPr lang="en-US" dirty="0" err="1">
+                  <a:solidFill>
+                    <a:schemeClr val="accent1">
+                      <a:lumMod val="75000"/>
+                    </a:schemeClr>
+                  </a:solidFill>
+                </a:rPr>
+                <a:t>int</a:t>
+              </a:r>
+              <a:r>
+                <a:rPr lang="en-US" dirty="0">
+                  <a:solidFill>
+                    <a:schemeClr val="accent1">
+                      <a:lumMod val="75000"/>
+                    </a:schemeClr>
+                  </a:solidFill>
+                </a:rPr>
+                <a:t> five = 5;  </a:t>
+              </a:r>
+            </a:p>
+          </p:txBody>
+        </p:sp>
+      </p:grpSp>
+    </p:spTree>
+    <p:extLst>
+      <p:ext uri="{BB962C8B-B14F-4D97-AF65-F5344CB8AC3E}">
+        <p14:creationId xmlns:p14="http://schemas.microsoft.com/office/powerpoint/2010/main" val="1696145766"/>
+      </p:ext>
+    </p:extLst>
+  </p:cSld>
+  <p:clrMapOvr>
+    <a:masterClrMapping/>
+  </p:clrMapOvr>
+</p:sld>
+</file>
+
+<file path=ppt/slides/slide9.xml><?xml version="1.0" encoding="utf-8"?>
+<p:sld xmlns:a="http://schemas.openxmlformats.org/drawingml/2006/main" xmlns:r="http://schemas.openxmlformats.org/officeDocument/2006/relationships" xmlns:p="http://schemas.openxmlformats.org/presentationml/2006/main">
+  <p:cSld>
+    <p:spTree>
+      <p:nvGrpSpPr>
+        <p:cNvPr id="1" name=""/>
+        <p:cNvGrpSpPr/>
+        <p:nvPr/>
+      </p:nvGrpSpPr>
+      <p:grpSpPr>
+        <a:xfrm>
+          <a:off x="0" y="0"/>
+          <a:ext cx="0" cy="0"/>
+          <a:chOff x="0" y="0"/>
+          <a:chExt cx="0" cy="0"/>
+        </a:xfrm>
+      </p:grpSpPr>
+      <p:sp>
+        <p:nvSpPr>
+          <p:cNvPr id="2" name="Title 1">
+            <a:extLst>
+              <a:ext uri="{FF2B5EF4-FFF2-40B4-BE49-F238E27FC236}">
+                <a16:creationId xmlns:a16="http://schemas.microsoft.com/office/drawing/2014/main" id="{651564EB-E8F0-0C45-9AE9-F5186408361F}"/>
+              </a:ext>
+            </a:extLst>
+          </p:cNvPr>
+          <p:cNvSpPr>
+            <a:spLocks noGrp="1"/>
+          </p:cNvSpPr>
+          <p:nvPr>
+            <p:ph type="title"/>
+          </p:nvPr>
+        </p:nvSpPr>
+        <p:spPr/>
+        <p:txBody>
+          <a:bodyPr/>
+          <a:lstStyle/>
+          <a:p>
+            <a:r>
+              <a:rPr lang="en-US" dirty="0" err="1"/>
+              <a:t>Conversiones</a:t>
+            </a:r>
+            <a:r>
+              <a:rPr lang="en-US" dirty="0"/>
+              <a:t> a y de Nullable&lt;T&gt;</a:t>
+            </a:r>
+          </a:p>
+        </p:txBody>
+      </p:sp>
+      <p:sp>
+        <p:nvSpPr>
+          <p:cNvPr id="3" name="Content Placeholder 2">
+            <a:extLst>
+              <a:ext uri="{FF2B5EF4-FFF2-40B4-BE49-F238E27FC236}">
+                <a16:creationId xmlns:a16="http://schemas.microsoft.com/office/drawing/2014/main" id="{BB895731-B346-1E48-BE6A-A160C5330FEE}"/>
+              </a:ext>
+            </a:extLst>
+          </p:cNvPr>
+          <p:cNvSpPr>
+            <a:spLocks noGrp="1"/>
+          </p:cNvSpPr>
+          <p:nvPr>
+            <p:ph idx="1"/>
+          </p:nvPr>
+        </p:nvSpPr>
+        <p:spPr>
+          <a:xfrm>
+            <a:off x="1970809" y="2471449"/>
+            <a:ext cx="8250382" cy="2746375"/>
+          </a:xfrm>
+        </p:spPr>
+        <p:txBody>
+          <a:bodyPr/>
+          <a:lstStyle/>
+          <a:p>
+            <a:r>
+              <a:rPr lang="en-US" dirty="0">
+                <a:solidFill>
+                  <a:schemeClr val="accent1">
+                    <a:lumMod val="75000"/>
+                  </a:schemeClr>
+                </a:solidFill>
+              </a:rPr>
+              <a:t>T a Nullable&lt;T&gt;			</a:t>
+            </a:r>
+            <a:r>
+              <a:rPr lang="en-US" dirty="0" err="1">
+                <a:solidFill>
+                  <a:schemeClr val="accent1">
+                    <a:lumMod val="75000"/>
+                  </a:schemeClr>
+                </a:solidFill>
+              </a:rPr>
+              <a:t>implícita</a:t>
+            </a:r>
+            <a:endParaRPr lang="en-US" dirty="0">
+              <a:solidFill>
+                <a:schemeClr val="accent1">
+                  <a:lumMod val="75000"/>
+                </a:schemeClr>
+              </a:solidFill>
+            </a:endParaRPr>
+          </a:p>
+          <a:p>
+            <a:r>
+              <a:rPr lang="en-US" dirty="0">
+                <a:solidFill>
+                  <a:schemeClr val="accent1">
+                    <a:lumMod val="75000"/>
+                  </a:schemeClr>
+                </a:solidFill>
+              </a:rPr>
+              <a:t>Nullable&lt;T&gt; a T			</a:t>
+            </a:r>
+            <a:r>
+              <a:rPr lang="en-US" dirty="0" err="1">
+                <a:solidFill>
+                  <a:schemeClr val="accent1">
+                    <a:lumMod val="75000"/>
+                  </a:schemeClr>
+                </a:solidFill>
+              </a:rPr>
+              <a:t>explícita</a:t>
+            </a:r>
+            <a:endParaRPr lang="en-US" dirty="0">
+              <a:solidFill>
+                <a:schemeClr val="accent1">
+                  <a:lumMod val="75000"/>
+                </a:schemeClr>
+              </a:solidFill>
+            </a:endParaRPr>
+          </a:p>
+          <a:p>
+            <a:r>
+              <a:rPr lang="fr" dirty="0" err="1">
+                <a:solidFill>
+                  <a:schemeClr val="accent1">
+                    <a:lumMod val="75000"/>
+                  </a:schemeClr>
+                </a:solidFill>
+              </a:rPr>
+              <a:t>Nullable</a:t>
+            </a:r>
+            <a:r>
+              <a:rPr lang="fr" dirty="0">
+                <a:solidFill>
+                  <a:schemeClr val="accent1">
+                    <a:lumMod val="75000"/>
+                  </a:schemeClr>
+                </a:solidFill>
+              </a:rPr>
+              <a:t>&lt;S&gt; a </a:t>
+            </a:r>
+            <a:r>
+              <a:rPr lang="fr" dirty="0" err="1">
+                <a:solidFill>
+                  <a:schemeClr val="accent1">
+                    <a:lumMod val="75000"/>
+                  </a:schemeClr>
+                </a:solidFill>
+              </a:rPr>
+              <a:t>Nullable</a:t>
+            </a:r>
+            <a:r>
+              <a:rPr lang="fr" dirty="0">
+                <a:solidFill>
+                  <a:schemeClr val="accent1">
+                    <a:lumMod val="75000"/>
+                  </a:schemeClr>
+                </a:solidFill>
+              </a:rPr>
+              <a:t>&lt;</a:t>
+            </a:r>
+            <a:r>
+              <a:rPr lang="fr" dirty="0" err="1">
+                <a:solidFill>
+                  <a:schemeClr val="accent1">
+                    <a:lumMod val="75000"/>
+                  </a:schemeClr>
+                </a:solidFill>
+              </a:rPr>
+              <a:t>T</a:t>
+            </a:r>
+            <a:r>
+              <a:rPr lang="fr" dirty="0">
+                <a:solidFill>
+                  <a:schemeClr val="accent1">
+                    <a:lumMod val="75000"/>
+                  </a:schemeClr>
+                </a:solidFill>
+              </a:rPr>
+              <a:t>&gt;	</a:t>
+            </a:r>
+            <a:r>
+              <a:rPr lang="fr" dirty="0" err="1">
+                <a:solidFill>
+                  <a:schemeClr val="accent1">
+                    <a:lumMod val="75000"/>
+                  </a:schemeClr>
+                </a:solidFill>
+              </a:rPr>
+              <a:t>implícita</a:t>
+            </a:r>
+            <a:r>
+              <a:rPr lang="fr" dirty="0">
+                <a:solidFill>
+                  <a:schemeClr val="accent1">
+                    <a:lumMod val="75000"/>
+                  </a:schemeClr>
+                </a:solidFill>
+              </a:rPr>
+              <a:t> o </a:t>
+            </a:r>
+            <a:r>
+              <a:rPr lang="fr" dirty="0" err="1">
+                <a:solidFill>
+                  <a:schemeClr val="accent1">
+                    <a:lumMod val="75000"/>
+                  </a:schemeClr>
+                </a:solidFill>
+              </a:rPr>
+              <a:t>explíctita</a:t>
+            </a:r>
+            <a:endParaRPr lang="fr" dirty="0">
+              <a:solidFill>
+                <a:schemeClr val="accent1">
+                  <a:lumMod val="75000"/>
+                </a:schemeClr>
+              </a:solidFill>
+            </a:endParaRPr>
+          </a:p>
+          <a:p>
+            <a:r>
+              <a:rPr lang="en-US" dirty="0">
+                <a:solidFill>
+                  <a:schemeClr val="accent1">
+                    <a:lumMod val="75000"/>
+                  </a:schemeClr>
+                </a:solidFill>
+              </a:rPr>
+              <a:t>S a Nullable&lt;T&gt;			</a:t>
+            </a:r>
+            <a:r>
+              <a:rPr lang="fr" dirty="0" err="1">
+                <a:solidFill>
+                  <a:schemeClr val="accent1">
+                    <a:lumMod val="75000"/>
+                  </a:schemeClr>
+                </a:solidFill>
+              </a:rPr>
+              <a:t>implícita</a:t>
+            </a:r>
+            <a:r>
+              <a:rPr lang="fr" dirty="0">
+                <a:solidFill>
+                  <a:schemeClr val="accent1">
+                    <a:lumMod val="75000"/>
+                  </a:schemeClr>
+                </a:solidFill>
+              </a:rPr>
+              <a:t> o </a:t>
+            </a:r>
+            <a:r>
+              <a:rPr lang="fr" dirty="0" err="1">
+                <a:solidFill>
+                  <a:schemeClr val="accent1">
+                    <a:lumMod val="75000"/>
+                  </a:schemeClr>
+                </a:solidFill>
+              </a:rPr>
+              <a:t>explíctita</a:t>
+            </a:r>
+            <a:endParaRPr lang="en-US" dirty="0">
+              <a:solidFill>
+                <a:schemeClr val="accent1">
+                  <a:lumMod val="75000"/>
+                </a:schemeClr>
+              </a:solidFill>
+            </a:endParaRPr>
+          </a:p>
+          <a:p>
+            <a:r>
+              <a:rPr lang="en-US" dirty="0">
+                <a:solidFill>
+                  <a:schemeClr val="accent1">
+                    <a:lumMod val="75000"/>
+                  </a:schemeClr>
+                </a:solidFill>
+              </a:rPr>
+              <a:t>Nullable&lt;S&gt; a T			</a:t>
+            </a:r>
+            <a:r>
+              <a:rPr lang="en-US" dirty="0" err="1">
+                <a:solidFill>
+                  <a:schemeClr val="accent1">
+                    <a:lumMod val="75000"/>
+                  </a:schemeClr>
+                </a:solidFill>
+              </a:rPr>
+              <a:t>explícita</a:t>
+            </a:r>
+            <a:endParaRPr lang="en-US" dirty="0">
+              <a:solidFill>
+                <a:schemeClr val="accent1">
+                  <a:lumMod val="75000"/>
+                </a:schemeClr>
+              </a:solidFill>
+            </a:endParaRPr>
+          </a:p>
+        </p:txBody>
+      </p:sp>
+    </p:spTree>
+    <p:extLst>
+      <p:ext uri="{BB962C8B-B14F-4D97-AF65-F5344CB8AC3E}">
+        <p14:creationId xmlns:p14="http://schemas.microsoft.com/office/powerpoint/2010/main" val="1496227589"/>
       </p:ext>
     </p:extLst>
   </p:cSld>

</xml_diff>